<commit_message>
Add revisions to definition reflecting jonathan's comments
</commit_message>
<xml_diff>
--- a/manuscript/interaction_modification.pptx
+++ b/manuscript/interaction_modification.pptx
@@ -243,7 +243,7 @@
           <a:p>
             <a:fld id="{DEC7EED3-ACBE-144B-BA53-7F4C4D475C19}" type="datetimeFigureOut">
               <a:rPr lang="en-US" smtClean="0"/>
-              <a:t>11/19/19</a:t>
+              <a:t>11/25/19</a:t>
             </a:fld>
             <a:endParaRPr lang="en-US"/>
           </a:p>
@@ -413,7 +413,7 @@
           <a:p>
             <a:fld id="{DEC7EED3-ACBE-144B-BA53-7F4C4D475C19}" type="datetimeFigureOut">
               <a:rPr lang="en-US" smtClean="0"/>
-              <a:t>11/19/19</a:t>
+              <a:t>11/25/19</a:t>
             </a:fld>
             <a:endParaRPr lang="en-US"/>
           </a:p>
@@ -593,7 +593,7 @@
           <a:p>
             <a:fld id="{DEC7EED3-ACBE-144B-BA53-7F4C4D475C19}" type="datetimeFigureOut">
               <a:rPr lang="en-US" smtClean="0"/>
-              <a:t>11/19/19</a:t>
+              <a:t>11/25/19</a:t>
             </a:fld>
             <a:endParaRPr lang="en-US"/>
           </a:p>
@@ -763,7 +763,7 @@
           <a:p>
             <a:fld id="{DEC7EED3-ACBE-144B-BA53-7F4C4D475C19}" type="datetimeFigureOut">
               <a:rPr lang="en-US" smtClean="0"/>
-              <a:t>11/19/19</a:t>
+              <a:t>11/25/19</a:t>
             </a:fld>
             <a:endParaRPr lang="en-US"/>
           </a:p>
@@ -1007,7 +1007,7 @@
           <a:p>
             <a:fld id="{DEC7EED3-ACBE-144B-BA53-7F4C4D475C19}" type="datetimeFigureOut">
               <a:rPr lang="en-US" smtClean="0"/>
-              <a:t>11/19/19</a:t>
+              <a:t>11/25/19</a:t>
             </a:fld>
             <a:endParaRPr lang="en-US"/>
           </a:p>
@@ -1239,7 +1239,7 @@
           <a:p>
             <a:fld id="{DEC7EED3-ACBE-144B-BA53-7F4C4D475C19}" type="datetimeFigureOut">
               <a:rPr lang="en-US" smtClean="0"/>
-              <a:t>11/19/19</a:t>
+              <a:t>11/25/19</a:t>
             </a:fld>
             <a:endParaRPr lang="en-US"/>
           </a:p>
@@ -1606,7 +1606,7 @@
           <a:p>
             <a:fld id="{DEC7EED3-ACBE-144B-BA53-7F4C4D475C19}" type="datetimeFigureOut">
               <a:rPr lang="en-US" smtClean="0"/>
-              <a:t>11/19/19</a:t>
+              <a:t>11/25/19</a:t>
             </a:fld>
             <a:endParaRPr lang="en-US"/>
           </a:p>
@@ -1724,7 +1724,7 @@
           <a:p>
             <a:fld id="{DEC7EED3-ACBE-144B-BA53-7F4C4D475C19}" type="datetimeFigureOut">
               <a:rPr lang="en-US" smtClean="0"/>
-              <a:t>11/19/19</a:t>
+              <a:t>11/25/19</a:t>
             </a:fld>
             <a:endParaRPr lang="en-US"/>
           </a:p>
@@ -1819,7 +1819,7 @@
           <a:p>
             <a:fld id="{DEC7EED3-ACBE-144B-BA53-7F4C4D475C19}" type="datetimeFigureOut">
               <a:rPr lang="en-US" smtClean="0"/>
-              <a:t>11/19/19</a:t>
+              <a:t>11/25/19</a:t>
             </a:fld>
             <a:endParaRPr lang="en-US"/>
           </a:p>
@@ -2096,7 +2096,7 @@
           <a:p>
             <a:fld id="{DEC7EED3-ACBE-144B-BA53-7F4C4D475C19}" type="datetimeFigureOut">
               <a:rPr lang="en-US" smtClean="0"/>
-              <a:t>11/19/19</a:t>
+              <a:t>11/25/19</a:t>
             </a:fld>
             <a:endParaRPr lang="en-US"/>
           </a:p>
@@ -2353,7 +2353,7 @@
           <a:p>
             <a:fld id="{DEC7EED3-ACBE-144B-BA53-7F4C4D475C19}" type="datetimeFigureOut">
               <a:rPr lang="en-US" smtClean="0"/>
-              <a:t>11/19/19</a:t>
+              <a:t>11/25/19</a:t>
             </a:fld>
             <a:endParaRPr lang="en-US"/>
           </a:p>
@@ -2566,7 +2566,7 @@
           <a:p>
             <a:fld id="{DEC7EED3-ACBE-144B-BA53-7F4C4D475C19}" type="datetimeFigureOut">
               <a:rPr lang="en-US" smtClean="0"/>
-              <a:t>11/19/19</a:t>
+              <a:t>11/25/19</a:t>
             </a:fld>
             <a:endParaRPr lang="en-US"/>
           </a:p>
@@ -2985,7 +2985,7 @@
         </p:nvSpPr>
         <p:spPr>
           <a:xfrm>
-            <a:off x="117617" y="1698720"/>
+            <a:off x="117617" y="1552416"/>
             <a:ext cx="2299099" cy="2154088"/>
           </a:xfrm>
           <a:prstGeom prst="rect">
@@ -3039,7 +3039,7 @@
         </p:nvSpPr>
         <p:spPr>
           <a:xfrm>
-            <a:off x="4933597" y="1737890"/>
+            <a:off x="4933597" y="1591586"/>
             <a:ext cx="2299099" cy="2154088"/>
           </a:xfrm>
           <a:prstGeom prst="rect">
@@ -3120,8 +3120,8 @@
           </a:fontRef>
         </p:style>
       </p:cxnSp>
-      <mc:AlternateContent xmlns:mc="http://schemas.openxmlformats.org/markup-compatibility/2006" xmlns:a14="http://schemas.microsoft.com/office/drawing/2010/main">
-        <mc:Choice Requires="a14">
+      <mc:AlternateContent xmlns:mc="http://schemas.openxmlformats.org/markup-compatibility/2006">
+        <mc:Choice xmlns:a14="http://schemas.microsoft.com/office/drawing/2010/main" Requires="a14">
           <p:sp>
             <p:nvSpPr>
               <p:cNvPr id="188" name="TextBox 187">
@@ -3136,7 +3136,7 @@
             </p:nvSpPr>
             <p:spPr>
               <a:xfrm>
-                <a:off x="132519" y="3937562"/>
+                <a:off x="132519" y="3791258"/>
                 <a:ext cx="2307391" cy="507768"/>
               </a:xfrm>
               <a:prstGeom prst="rect">
@@ -3178,7 +3178,7 @@
                             <a:rPr lang="en-US" sz="1600" b="0" i="1" smtClean="0">
                               <a:latin typeface="Cambria Math" panose="02040503050406030204" pitchFamily="18" charset="0"/>
                             </a:rPr>
-                            <m:t>1</m:t>
+                            <m:t>𝑖</m:t>
                           </m:r>
                         </m:sub>
                       </m:sSub>
@@ -3226,7 +3226,7 @@
                                 <a:rPr lang="en-US" sz="1600" b="0" i="1" smtClean="0">
                                   <a:latin typeface="Cambria Math" panose="02040503050406030204" pitchFamily="18" charset="0"/>
                                 </a:rPr>
-                                <m:t>1</m:t>
+                                <m:t>𝑖</m:t>
                               </m:r>
                             </m:sub>
                           </m:sSub>
@@ -3268,7 +3268,7 @@
                                 <a:rPr lang="en-US" sz="1600" b="0" i="1" smtClean="0">
                                   <a:latin typeface="Cambria Math" panose="02040503050406030204" pitchFamily="18" charset="0"/>
                                 </a:rPr>
-                                <m:t>1</m:t>
+                                <m:t>𝑖</m:t>
                               </m:r>
                             </m:sub>
                           </m:sSub>
@@ -3288,12 +3288,31 @@
                         </a:rPr>
                         <m:t>=</m:t>
                       </m:r>
-                      <m:r>
-                        <a:rPr lang="en-US" sz="1600" i="1" smtClean="0">
-                          <a:latin typeface="Cambria Math" panose="02040503050406030204" pitchFamily="18" charset="0"/>
-                        </a:rPr>
-                        <m:t>𝐹</m:t>
-                      </m:r>
+                      <m:sSub>
+                        <m:sSubPr>
+                          <m:ctrlPr>
+                            <a:rPr lang="en-US" sz="1600" b="0" i="1" smtClean="0">
+                              <a:latin typeface="Cambria Math" panose="02040503050406030204" pitchFamily="18" charset="0"/>
+                            </a:rPr>
+                          </m:ctrlPr>
+                        </m:sSubPr>
+                        <m:e>
+                          <m:r>
+                            <a:rPr lang="en-US" sz="1600" i="1" smtClean="0">
+                              <a:latin typeface="Cambria Math" panose="02040503050406030204" pitchFamily="18" charset="0"/>
+                            </a:rPr>
+                            <m:t>𝐹</m:t>
+                          </m:r>
+                        </m:e>
+                        <m:sub>
+                          <m:r>
+                            <a:rPr lang="en-US" sz="1600" b="0" i="1" smtClean="0">
+                              <a:latin typeface="Cambria Math" panose="02040503050406030204" pitchFamily="18" charset="0"/>
+                            </a:rPr>
+                            <m:t>𝑖</m:t>
+                          </m:r>
+                        </m:sub>
+                      </m:sSub>
                       <m:d>
                         <m:dPr>
                           <m:ctrlPr>
@@ -3303,6 +3322,37 @@
                           </m:ctrlPr>
                         </m:dPr>
                         <m:e>
+                          <m:sSub>
+                            <m:sSubPr>
+                              <m:ctrlPr>
+                                <a:rPr lang="en-US" sz="1600" i="1">
+                                  <a:latin typeface="Cambria Math" panose="02040503050406030204" pitchFamily="18" charset="0"/>
+                                </a:rPr>
+                              </m:ctrlPr>
+                            </m:sSubPr>
+                            <m:e>
+                              <m:r>
+                                <a:rPr lang="en-US" sz="1600" b="0" i="1" smtClean="0">
+                                  <a:latin typeface="Cambria Math" panose="02040503050406030204" pitchFamily="18" charset="0"/>
+                                </a:rPr>
+                                <m:t>𝑛</m:t>
+                              </m:r>
+                            </m:e>
+                            <m:sub>
+                              <m:r>
+                                <a:rPr lang="en-US" sz="1600" b="0" i="1" smtClean="0">
+                                  <a:latin typeface="Cambria Math" panose="02040503050406030204" pitchFamily="18" charset="0"/>
+                                </a:rPr>
+                                <m:t>1</m:t>
+                              </m:r>
+                            </m:sub>
+                          </m:sSub>
+                          <m:r>
+                            <a:rPr lang="en-US" sz="1600" i="1">
+                              <a:latin typeface="Cambria Math" panose="02040503050406030204" pitchFamily="18" charset="0"/>
+                            </a:rPr>
+                            <m:t>, </m:t>
+                          </m:r>
                           <m:sSub>
                             <m:sSubPr>
                               <m:ctrlPr>
@@ -3328,37 +3378,6 @@
                               </m:r>
                             </m:sub>
                           </m:sSub>
-                          <m:r>
-                            <a:rPr lang="en-US" sz="1600" i="1">
-                              <a:latin typeface="Cambria Math" panose="02040503050406030204" pitchFamily="18" charset="0"/>
-                            </a:rPr>
-                            <m:t>, </m:t>
-                          </m:r>
-                          <m:sSub>
-                            <m:sSubPr>
-                              <m:ctrlPr>
-                                <a:rPr lang="en-US" sz="1600" i="1">
-                                  <a:latin typeface="Cambria Math" panose="02040503050406030204" pitchFamily="18" charset="0"/>
-                                </a:rPr>
-                              </m:ctrlPr>
-                            </m:sSubPr>
-                            <m:e>
-                              <m:r>
-                                <a:rPr lang="en-US" sz="1600" b="0" i="1" smtClean="0">
-                                  <a:latin typeface="Cambria Math" panose="02040503050406030204" pitchFamily="18" charset="0"/>
-                                </a:rPr>
-                                <m:t>𝑛</m:t>
-                              </m:r>
-                            </m:e>
-                            <m:sub>
-                              <m:r>
-                                <a:rPr lang="en-US" sz="1600" b="0" i="1" smtClean="0">
-                                  <a:latin typeface="Cambria Math" panose="02040503050406030204" pitchFamily="18" charset="0"/>
-                                </a:rPr>
-                                <m:t>3</m:t>
-                              </m:r>
-                            </m:sub>
-                          </m:sSub>
                         </m:e>
                       </m:d>
                     </m:oMath>
@@ -3369,7 +3388,7 @@
             </p:txBody>
           </p:sp>
         </mc:Choice>
-        <mc:Fallback xmlns="">
+        <mc:Fallback>
           <p:sp>
             <p:nvSpPr>
               <p:cNvPr id="188" name="TextBox 187">
@@ -3386,7 +3405,7 @@
             </p:nvSpPr>
             <p:spPr>
               <a:xfrm>
-                <a:off x="132519" y="3937562"/>
+                <a:off x="132519" y="3791258"/>
                 <a:ext cx="2307391" cy="507768"/>
               </a:xfrm>
               <a:prstGeom prst="rect">
@@ -3431,8 +3450,8 @@
         </p:nvCxnSpPr>
         <p:spPr>
           <a:xfrm flipH="1">
-            <a:off x="360900" y="2247893"/>
-            <a:ext cx="729586" cy="971893"/>
+            <a:off x="345447" y="2101589"/>
+            <a:ext cx="745039" cy="971893"/>
           </a:xfrm>
           <a:prstGeom prst="straightConnector1">
             <a:avLst/>
@@ -3456,8 +3475,8 @@
           </a:fontRef>
         </p:style>
       </p:cxnSp>
-      <mc:AlternateContent xmlns:mc="http://schemas.openxmlformats.org/markup-compatibility/2006" xmlns:a14="http://schemas.microsoft.com/office/drawing/2010/main">
-        <mc:Choice Requires="a14">
+      <mc:AlternateContent xmlns:mc="http://schemas.openxmlformats.org/markup-compatibility/2006">
+        <mc:Choice xmlns:a14="http://schemas.microsoft.com/office/drawing/2010/main" Requires="a14">
           <p:sp>
             <p:nvSpPr>
               <p:cNvPr id="190" name="TextBox 189">
@@ -3472,7 +3491,7 @@
             </p:nvSpPr>
             <p:spPr>
               <a:xfrm>
-                <a:off x="1022093" y="1868065"/>
+                <a:off x="1022093" y="1721761"/>
                 <a:ext cx="474399" cy="400110"/>
               </a:xfrm>
               <a:prstGeom prst="rect">
@@ -3514,7 +3533,7 @@
                             <a:rPr lang="en-US" sz="2000" b="0" i="1" smtClean="0">
                               <a:latin typeface="Cambria Math" panose="02040503050406030204" pitchFamily="18" charset="0"/>
                             </a:rPr>
-                            <m:t>2</m:t>
+                            <m:t>1</m:t>
                           </m:r>
                         </m:sub>
                       </m:sSub>
@@ -3526,7 +3545,7 @@
             </p:txBody>
           </p:sp>
         </mc:Choice>
-        <mc:Fallback xmlns="">
+        <mc:Fallback>
           <p:sp>
             <p:nvSpPr>
               <p:cNvPr id="190" name="TextBox 189">
@@ -3543,7 +3562,7 @@
             </p:nvSpPr>
             <p:spPr>
               <a:xfrm>
-                <a:off x="1022093" y="1868065"/>
+                <a:off x="1022093" y="1721761"/>
                 <a:ext cx="474399" cy="400110"/>
               </a:xfrm>
               <a:prstGeom prst="rect">
@@ -3571,8 +3590,8 @@
           </p:sp>
         </mc:Fallback>
       </mc:AlternateContent>
-      <mc:AlternateContent xmlns:mc="http://schemas.openxmlformats.org/markup-compatibility/2006" xmlns:a14="http://schemas.microsoft.com/office/drawing/2010/main">
-        <mc:Choice Requires="a14">
+      <mc:AlternateContent xmlns:mc="http://schemas.openxmlformats.org/markup-compatibility/2006">
+        <mc:Choice xmlns:a14="http://schemas.microsoft.com/office/drawing/2010/main" Requires="a14">
           <p:sp>
             <p:nvSpPr>
               <p:cNvPr id="191" name="Rectangle 190">
@@ -3587,8 +3606,8 @@
             </p:nvSpPr>
             <p:spPr>
               <a:xfrm>
-                <a:off x="114614" y="3219786"/>
-                <a:ext cx="492571" cy="400110"/>
+                <a:off x="114614" y="3073482"/>
+                <a:ext cx="461665" cy="400110"/>
               </a:xfrm>
               <a:prstGeom prst="rect">
                 <a:avLst/>
@@ -3628,7 +3647,7 @@
                             <a:rPr lang="en-US" sz="2000" b="0" i="1" smtClean="0">
                               <a:latin typeface="Cambria Math" panose="02040503050406030204" pitchFamily="18" charset="0"/>
                             </a:rPr>
-                            <m:t>1</m:t>
+                            <m:t>𝑖</m:t>
                           </m:r>
                         </m:sub>
                       </m:sSub>
@@ -3640,7 +3659,7 @@
             </p:txBody>
           </p:sp>
         </mc:Choice>
-        <mc:Fallback xmlns="">
+        <mc:Fallback>
           <p:sp>
             <p:nvSpPr>
               <p:cNvPr id="191" name="Rectangle 190">
@@ -3657,8 +3676,8 @@
             </p:nvSpPr>
             <p:spPr>
               <a:xfrm>
-                <a:off x="114614" y="3219786"/>
-                <a:ext cx="492571" cy="400110"/>
+                <a:off x="114614" y="3073482"/>
+                <a:ext cx="461665" cy="400110"/>
               </a:xfrm>
               <a:prstGeom prst="rect">
                 <a:avLst/>
@@ -3666,7 +3685,7 @@
               <a:blipFill>
                 <a:blip r:embed="rId4"/>
                 <a:stretch>
-                  <a:fillRect b="-6250"/>
+                  <a:fillRect b="-3030"/>
                 </a:stretch>
               </a:blipFill>
             </p:spPr>
@@ -3685,8 +3704,8 @@
           </p:sp>
         </mc:Fallback>
       </mc:AlternateContent>
-      <mc:AlternateContent xmlns:mc="http://schemas.openxmlformats.org/markup-compatibility/2006" xmlns:a14="http://schemas.microsoft.com/office/drawing/2010/main">
-        <mc:Choice Requires="a14">
+      <mc:AlternateContent xmlns:mc="http://schemas.openxmlformats.org/markup-compatibility/2006">
+        <mc:Choice xmlns:a14="http://schemas.microsoft.com/office/drawing/2010/main" Requires="a14">
           <p:sp>
             <p:nvSpPr>
               <p:cNvPr id="192" name="TextBox 191">
@@ -3701,7 +3720,7 @@
             </p:nvSpPr>
             <p:spPr>
               <a:xfrm>
-                <a:off x="1773678" y="3211741"/>
+                <a:off x="1773678" y="3065437"/>
                 <a:ext cx="474399" cy="400110"/>
               </a:xfrm>
               <a:prstGeom prst="rect">
@@ -3752,7 +3771,7 @@
                               </a:solidFill>
                               <a:latin typeface="Cambria Math" panose="02040503050406030204" pitchFamily="18" charset="0"/>
                             </a:rPr>
-                            <m:t>3</m:t>
+                            <m:t>2</m:t>
                           </m:r>
                         </m:sub>
                       </m:sSub>
@@ -3768,7 +3787,7 @@
             </p:txBody>
           </p:sp>
         </mc:Choice>
-        <mc:Fallback xmlns="">
+        <mc:Fallback>
           <p:sp>
             <p:nvSpPr>
               <p:cNvPr id="192" name="TextBox 191">
@@ -3785,7 +3804,7 @@
             </p:nvSpPr>
             <p:spPr>
               <a:xfrm>
-                <a:off x="1773678" y="3211741"/>
+                <a:off x="1773678" y="3065437"/>
                 <a:ext cx="474399" cy="400110"/>
               </a:xfrm>
               <a:prstGeom prst="rect">
@@ -3829,7 +3848,7 @@
         </p:nvCxnSpPr>
         <p:spPr>
           <a:xfrm flipH="1">
-            <a:off x="611078" y="3428045"/>
+            <a:off x="611078" y="3281741"/>
             <a:ext cx="1117138" cy="0"/>
           </a:xfrm>
           <a:prstGeom prst="straightConnector1">
@@ -3868,7 +3887,7 @@
         </p:nvSpPr>
         <p:spPr>
           <a:xfrm>
-            <a:off x="314565" y="485672"/>
+            <a:off x="314565" y="140551"/>
             <a:ext cx="1877543" cy="400110"/>
           </a:xfrm>
           <a:prstGeom prst="rect">
@@ -3904,7 +3923,7 @@
         </p:nvSpPr>
         <p:spPr>
           <a:xfrm>
-            <a:off x="141114" y="501903"/>
+            <a:off x="141114" y="140551"/>
             <a:ext cx="412292" cy="400110"/>
           </a:xfrm>
           <a:prstGeom prst="rect">
@@ -3939,7 +3958,7 @@
         </p:nvSpPr>
         <p:spPr>
           <a:xfrm>
-            <a:off x="2563652" y="510720"/>
+            <a:off x="2563652" y="140551"/>
             <a:ext cx="402674" cy="400110"/>
           </a:xfrm>
           <a:prstGeom prst="rect">
@@ -3960,8 +3979,8 @@
           </a:p>
         </p:txBody>
       </p:sp>
-      <mc:AlternateContent xmlns:mc="http://schemas.openxmlformats.org/markup-compatibility/2006" xmlns:a14="http://schemas.microsoft.com/office/drawing/2010/main">
-        <mc:Choice Requires="a14">
+      <mc:AlternateContent xmlns:mc="http://schemas.openxmlformats.org/markup-compatibility/2006">
+        <mc:Choice xmlns:a14="http://schemas.microsoft.com/office/drawing/2010/main" Requires="a14">
           <p:sp>
             <p:nvSpPr>
               <p:cNvPr id="50" name="TextBox 49">
@@ -3976,7 +3995,7 @@
             </p:nvSpPr>
             <p:spPr>
               <a:xfrm>
-                <a:off x="560167" y="2437210"/>
+                <a:off x="560167" y="2290906"/>
                 <a:ext cx="398674" cy="347091"/>
               </a:xfrm>
               <a:prstGeom prst="rect">
@@ -4025,7 +4044,13 @@
                             <a:rPr lang="en-US" sz="1600" b="0" i="1" dirty="0" smtClean="0">
                               <a:latin typeface="Cambria Math" panose="02040503050406030204" pitchFamily="18" charset="0"/>
                             </a:rPr>
-                            <m:t>12</m:t>
+                            <m:t>𝑖</m:t>
+                          </m:r>
+                          <m:r>
+                            <a:rPr lang="en-US" sz="1600" b="0" i="1" dirty="0" smtClean="0">
+                              <a:latin typeface="Cambria Math" panose="02040503050406030204" pitchFamily="18" charset="0"/>
+                            </a:rPr>
+                            <m:t>1</m:t>
                           </m:r>
                         </m:sub>
                       </m:sSub>
@@ -4037,7 +4062,7 @@
             </p:txBody>
           </p:sp>
         </mc:Choice>
-        <mc:Fallback xmlns="">
+        <mc:Fallback>
           <p:sp>
             <p:nvSpPr>
               <p:cNvPr id="50" name="TextBox 49">
@@ -4054,7 +4079,7 @@
             </p:nvSpPr>
             <p:spPr>
               <a:xfrm>
-                <a:off x="560167" y="2437210"/>
+                <a:off x="560167" y="2290906"/>
                 <a:ext cx="398674" cy="347091"/>
               </a:xfrm>
               <a:prstGeom prst="rect">
@@ -4063,7 +4088,7 @@
               <a:blipFill>
                 <a:blip r:embed="rId6"/>
                 <a:stretch>
-                  <a:fillRect r="-6061"/>
+                  <a:fillRect/>
                 </a:stretch>
               </a:blipFill>
               <a:ln>
@@ -4087,8 +4112,8 @@
           </p:sp>
         </mc:Fallback>
       </mc:AlternateContent>
-      <mc:AlternateContent xmlns:mc="http://schemas.openxmlformats.org/markup-compatibility/2006" xmlns:a14="http://schemas.microsoft.com/office/drawing/2010/main">
-        <mc:Choice Requires="a14">
+      <mc:AlternateContent xmlns:mc="http://schemas.openxmlformats.org/markup-compatibility/2006">
+        <mc:Choice xmlns:a14="http://schemas.microsoft.com/office/drawing/2010/main" Requires="a14">
           <p:sp>
             <p:nvSpPr>
               <p:cNvPr id="51" name="TextBox 50">
@@ -4103,7 +4128,7 @@
             </p:nvSpPr>
             <p:spPr>
               <a:xfrm>
-                <a:off x="1048159" y="3250458"/>
+                <a:off x="1048159" y="3104154"/>
                 <a:ext cx="432044" cy="338554"/>
               </a:xfrm>
               <a:prstGeom prst="rect">
@@ -4152,7 +4177,13 @@
                             <a:rPr lang="en-US" sz="1600" b="0" i="1" dirty="0" smtClean="0">
                               <a:latin typeface="Cambria Math" panose="02040503050406030204" pitchFamily="18" charset="0"/>
                             </a:rPr>
-                            <m:t>13</m:t>
+                            <m:t>𝑖</m:t>
+                          </m:r>
+                          <m:r>
+                            <a:rPr lang="en-US" sz="1600" b="0" i="1" dirty="0" smtClean="0">
+                              <a:latin typeface="Cambria Math" panose="02040503050406030204" pitchFamily="18" charset="0"/>
+                            </a:rPr>
+                            <m:t>2</m:t>
                           </m:r>
                         </m:sub>
                       </m:sSub>
@@ -4164,7 +4195,7 @@
             </p:txBody>
           </p:sp>
         </mc:Choice>
-        <mc:Fallback xmlns="">
+        <mc:Fallback>
           <p:sp>
             <p:nvSpPr>
               <p:cNvPr id="51" name="TextBox 50">
@@ -4181,7 +4212,7 @@
             </p:nvSpPr>
             <p:spPr>
               <a:xfrm>
-                <a:off x="1048159" y="3250458"/>
+                <a:off x="1048159" y="3104154"/>
                 <a:ext cx="432044" cy="338554"/>
               </a:xfrm>
               <a:prstGeom prst="rect">
@@ -4228,10 +4259,10 @@
         </p:nvGrpSpPr>
         <p:grpSpPr>
           <a:xfrm>
-            <a:off x="3182413" y="1335634"/>
-            <a:ext cx="1307035" cy="1207188"/>
-            <a:chOff x="918508" y="475875"/>
-            <a:chExt cx="1095898" cy="591369"/>
+            <a:off x="3151507" y="1180214"/>
+            <a:ext cx="1337941" cy="1216304"/>
+            <a:chOff x="892595" y="457969"/>
+            <a:chExt cx="1121812" cy="595837"/>
           </a:xfrm>
         </p:grpSpPr>
         <p:cxnSp>
@@ -4245,13 +4276,12 @@
             </p:cNvPr>
             <p:cNvCxnSpPr>
               <a:cxnSpLocks/>
-              <a:stCxn id="94" idx="2"/>
             </p:cNvCxnSpPr>
             <p:nvPr/>
           </p:nvCxnSpPr>
           <p:spPr>
             <a:xfrm>
-              <a:off x="1510227" y="475875"/>
+              <a:off x="1510227" y="457969"/>
               <a:ext cx="0" cy="485466"/>
             </a:xfrm>
             <a:prstGeom prst="straightConnector1">
@@ -4295,8 +4325,8 @@
           </p:nvCxnSpPr>
           <p:spPr>
             <a:xfrm flipH="1" flipV="1">
-              <a:off x="918508" y="1062765"/>
-              <a:ext cx="1095898" cy="4479"/>
+              <a:off x="892595" y="1049327"/>
+              <a:ext cx="1121812" cy="4479"/>
             </a:xfrm>
             <a:prstGeom prst="straightConnector1">
               <a:avLst/>
@@ -4336,7 +4366,7 @@
         </p:nvSpPr>
         <p:spPr>
           <a:xfrm>
-            <a:off x="2966326" y="486027"/>
+            <a:off x="2966326" y="140551"/>
             <a:ext cx="3050845" cy="400110"/>
           </a:xfrm>
           <a:prstGeom prst="rect">
@@ -4374,7 +4404,7 @@
         </p:nvCxnSpPr>
         <p:spPr>
           <a:xfrm flipH="1">
-            <a:off x="3024584" y="1313709"/>
+            <a:off x="3024584" y="1167405"/>
             <a:ext cx="685653" cy="1051584"/>
           </a:xfrm>
           <a:prstGeom prst="straightConnector1">
@@ -4399,8 +4429,8 @@
           </a:fontRef>
         </p:style>
       </p:cxnSp>
-      <mc:AlternateContent xmlns:mc="http://schemas.openxmlformats.org/markup-compatibility/2006" xmlns:a14="http://schemas.microsoft.com/office/drawing/2010/main">
-        <mc:Choice Requires="a14">
+      <mc:AlternateContent xmlns:mc="http://schemas.openxmlformats.org/markup-compatibility/2006">
+        <mc:Choice xmlns:a14="http://schemas.microsoft.com/office/drawing/2010/main" Requires="a14">
           <p:sp>
             <p:nvSpPr>
               <p:cNvPr id="93" name="TextBox 92">
@@ -4415,7 +4445,7 @@
             </p:nvSpPr>
             <p:spPr>
               <a:xfrm>
-                <a:off x="3226950" y="1661757"/>
+                <a:off x="3226950" y="1515453"/>
                 <a:ext cx="398674" cy="347091"/>
               </a:xfrm>
               <a:prstGeom prst="rect">
@@ -4464,7 +4494,13 @@
                             <a:rPr lang="en-US" sz="1600" b="0" i="1" dirty="0" smtClean="0">
                               <a:latin typeface="Cambria Math" panose="02040503050406030204" pitchFamily="18" charset="0"/>
                             </a:rPr>
-                            <m:t>12</m:t>
+                            <m:t>𝑖</m:t>
+                          </m:r>
+                          <m:r>
+                            <a:rPr lang="en-US" sz="1600" b="0" i="1" dirty="0" smtClean="0">
+                              <a:latin typeface="Cambria Math" panose="02040503050406030204" pitchFamily="18" charset="0"/>
+                            </a:rPr>
+                            <m:t>1</m:t>
                           </m:r>
                         </m:sub>
                       </m:sSub>
@@ -4476,7 +4512,7 @@
             </p:txBody>
           </p:sp>
         </mc:Choice>
-        <mc:Fallback xmlns="">
+        <mc:Fallback>
           <p:sp>
             <p:nvSpPr>
               <p:cNvPr id="93" name="TextBox 92">
@@ -4493,7 +4529,7 @@
             </p:nvSpPr>
             <p:spPr>
               <a:xfrm>
-                <a:off x="3226950" y="1661757"/>
+                <a:off x="3226950" y="1515453"/>
                 <a:ext cx="398674" cy="347091"/>
               </a:xfrm>
               <a:prstGeom prst="rect">
@@ -4502,7 +4538,7 @@
               <a:blipFill>
                 <a:blip r:embed="rId8"/>
                 <a:stretch>
-                  <a:fillRect r="-6061"/>
+                  <a:fillRect/>
                 </a:stretch>
               </a:blipFill>
               <a:ln>
@@ -4540,14 +4576,14 @@
         </p:nvGrpSpPr>
         <p:grpSpPr>
           <a:xfrm>
-            <a:off x="5003889" y="1808794"/>
+            <a:off x="5003889" y="1662490"/>
             <a:ext cx="2300807" cy="1770319"/>
             <a:chOff x="2708032" y="716943"/>
             <a:chExt cx="1398437" cy="694108"/>
           </a:xfrm>
         </p:grpSpPr>
-        <mc:AlternateContent xmlns:mc="http://schemas.openxmlformats.org/markup-compatibility/2006" xmlns:a14="http://schemas.microsoft.com/office/drawing/2010/main">
-          <mc:Choice Requires="a14">
+        <mc:AlternateContent xmlns:mc="http://schemas.openxmlformats.org/markup-compatibility/2006">
+          <mc:Choice xmlns:a14="http://schemas.microsoft.com/office/drawing/2010/main" Requires="a14">
             <p:sp>
               <p:nvSpPr>
                 <p:cNvPr id="149" name="TextBox 148">
@@ -4604,7 +4640,7 @@
                               <a:rPr lang="en-US" sz="2000" b="0" i="1" smtClean="0">
                                 <a:latin typeface="Cambria Math" panose="02040503050406030204" pitchFamily="18" charset="0"/>
                               </a:rPr>
-                              <m:t>2</m:t>
+                              <m:t>1</m:t>
                             </m:r>
                           </m:sub>
                         </m:sSub>
@@ -4616,7 +4652,7 @@
               </p:txBody>
             </p:sp>
           </mc:Choice>
-          <mc:Fallback xmlns="">
+          <mc:Fallback>
             <p:sp>
               <p:nvSpPr>
                 <p:cNvPr id="149" name="TextBox 148">
@@ -4661,8 +4697,8 @@
             </p:sp>
           </mc:Fallback>
         </mc:AlternateContent>
-        <mc:AlternateContent xmlns:mc="http://schemas.openxmlformats.org/markup-compatibility/2006" xmlns:a14="http://schemas.microsoft.com/office/drawing/2010/main">
-          <mc:Choice Requires="a14">
+        <mc:AlternateContent xmlns:mc="http://schemas.openxmlformats.org/markup-compatibility/2006">
+          <mc:Choice xmlns:a14="http://schemas.microsoft.com/office/drawing/2010/main" Requires="a14">
             <p:sp>
               <p:nvSpPr>
                 <p:cNvPr id="150" name="Rectangle 149">
@@ -4678,7 +4714,7 @@
               <p:spPr>
                 <a:xfrm>
                   <a:off x="2708032" y="1251048"/>
-                  <a:ext cx="299386" cy="156875"/>
+                  <a:ext cx="280601" cy="156875"/>
                 </a:xfrm>
                 <a:prstGeom prst="rect">
                   <a:avLst/>
@@ -4718,7 +4754,7 @@
                               <a:rPr lang="en-US" sz="2000" b="0" i="1" smtClean="0">
                                 <a:latin typeface="Cambria Math" panose="02040503050406030204" pitchFamily="18" charset="0"/>
                               </a:rPr>
-                              <m:t>1</m:t>
+                              <m:t>𝑖</m:t>
                             </m:r>
                           </m:sub>
                         </m:sSub>
@@ -4730,7 +4766,7 @@
               </p:txBody>
             </p:sp>
           </mc:Choice>
-          <mc:Fallback xmlns="">
+          <mc:Fallback>
             <p:sp>
               <p:nvSpPr>
                 <p:cNvPr id="150" name="Rectangle 149">
@@ -4748,7 +4784,7 @@
               <p:spPr>
                 <a:xfrm>
                   <a:off x="2708032" y="1251048"/>
-                  <a:ext cx="299386" cy="156875"/>
+                  <a:ext cx="280601" cy="156875"/>
                 </a:xfrm>
                 <a:prstGeom prst="rect">
                   <a:avLst/>
@@ -4756,7 +4792,7 @@
                 <a:blipFill>
                   <a:blip r:embed="rId10"/>
                   <a:stretch>
-                    <a:fillRect b="-6250"/>
+                    <a:fillRect b="-3030"/>
                   </a:stretch>
                 </a:blipFill>
               </p:spPr>
@@ -4775,8 +4811,8 @@
             </p:sp>
           </mc:Fallback>
         </mc:AlternateContent>
-        <mc:AlternateContent xmlns:mc="http://schemas.openxmlformats.org/markup-compatibility/2006" xmlns:a14="http://schemas.microsoft.com/office/drawing/2010/main">
-          <mc:Choice Requires="a14">
+        <mc:AlternateContent xmlns:mc="http://schemas.openxmlformats.org/markup-compatibility/2006">
+          <mc:Choice xmlns:a14="http://schemas.microsoft.com/office/drawing/2010/main" Requires="a14">
             <p:sp>
               <p:nvSpPr>
                 <p:cNvPr id="151" name="TextBox 150">
@@ -4842,7 +4878,7 @@
                                 </a:solidFill>
                                 <a:latin typeface="Cambria Math" panose="02040503050406030204" pitchFamily="18" charset="0"/>
                               </a:rPr>
-                              <m:t>3</m:t>
+                              <m:t>2</m:t>
                             </m:r>
                           </m:sub>
                         </m:sSub>
@@ -4858,7 +4894,7 @@
               </p:txBody>
             </p:sp>
           </mc:Choice>
-          <mc:Fallback xmlns="">
+          <mc:Fallback>
             <p:sp>
               <p:nvSpPr>
                 <p:cNvPr id="151" name="TextBox 150">
@@ -4918,7 +4954,7 @@
         </p:nvSpPr>
         <p:spPr>
           <a:xfrm rot="11815864">
-            <a:off x="5622825" y="2234783"/>
+            <a:off x="5622825" y="2088479"/>
             <a:ext cx="505326" cy="1160302"/>
           </a:xfrm>
           <a:custGeom>
@@ -5010,7 +5046,7 @@
         </p:nvSpPr>
         <p:spPr>
           <a:xfrm rot="6116020" flipV="1">
-            <a:off x="5887544" y="2610417"/>
+            <a:off x="5887544" y="2464113"/>
             <a:ext cx="421436" cy="1205788"/>
           </a:xfrm>
           <a:custGeom>
@@ -5102,7 +5138,7 @@
         </p:nvSpPr>
         <p:spPr>
           <a:xfrm>
-            <a:off x="2738635" y="1011967"/>
+            <a:off x="2738635" y="865663"/>
             <a:ext cx="322524" cy="400110"/>
           </a:xfrm>
           <a:prstGeom prst="rect">
@@ -5137,7 +5173,7 @@
         </p:nvSpPr>
         <p:spPr>
           <a:xfrm>
-            <a:off x="5019277" y="1837207"/>
+            <a:off x="5019277" y="1690903"/>
             <a:ext cx="441146" cy="400110"/>
           </a:xfrm>
           <a:prstGeom prst="rect">
@@ -5158,8 +5194,8 @@
           </a:p>
         </p:txBody>
       </p:sp>
-      <mc:AlternateContent xmlns:mc="http://schemas.openxmlformats.org/markup-compatibility/2006" xmlns:a14="http://schemas.microsoft.com/office/drawing/2010/main">
-        <mc:Choice Requires="a14">
+      <mc:AlternateContent xmlns:mc="http://schemas.openxmlformats.org/markup-compatibility/2006">
+        <mc:Choice xmlns:a14="http://schemas.microsoft.com/office/drawing/2010/main" Requires="a14">
           <p:sp>
             <p:nvSpPr>
               <p:cNvPr id="212" name="TextBox 211">
@@ -5174,7 +5210,7 @@
             </p:nvSpPr>
             <p:spPr>
               <a:xfrm>
-                <a:off x="6032886" y="2519485"/>
+                <a:off x="6032886" y="2373181"/>
                 <a:ext cx="636756" cy="355867"/>
               </a:xfrm>
               <a:prstGeom prst="rect">
@@ -5223,7 +5259,7 @@
                             <a:rPr lang="en-US" sz="1600" b="0" i="1" dirty="0" smtClean="0">
                               <a:latin typeface="Cambria Math" panose="02040503050406030204" pitchFamily="18" charset="0"/>
                             </a:rPr>
-                            <m:t>1</m:t>
+                            <m:t>𝑖</m:t>
                           </m:r>
                           <m:d>
                             <m:dPr>
@@ -5238,7 +5274,19 @@
                                 <a:rPr lang="en-US" sz="1600" b="0" i="1" dirty="0" smtClean="0">
                                   <a:latin typeface="Cambria Math" panose="02040503050406030204" pitchFamily="18" charset="0"/>
                                 </a:rPr>
-                                <m:t>2,3</m:t>
+                                <m:t>1</m:t>
+                              </m:r>
+                              <m:r>
+                                <a:rPr lang="en-US" sz="1600" b="0" i="1" dirty="0" smtClean="0">
+                                  <a:latin typeface="Cambria Math" panose="02040503050406030204" pitchFamily="18" charset="0"/>
+                                </a:rPr>
+                                <m:t>,</m:t>
+                              </m:r>
+                              <m:r>
+                                <a:rPr lang="en-US" sz="1600" b="0" i="1" dirty="0" smtClean="0">
+                                  <a:latin typeface="Cambria Math" panose="02040503050406030204" pitchFamily="18" charset="0"/>
+                                </a:rPr>
+                                <m:t>2</m:t>
                               </m:r>
                             </m:e>
                           </m:d>
@@ -5252,7 +5300,7 @@
             </p:txBody>
           </p:sp>
         </mc:Choice>
-        <mc:Fallback xmlns="">
+        <mc:Fallback>
           <p:sp>
             <p:nvSpPr>
               <p:cNvPr id="212" name="TextBox 211">
@@ -5269,7 +5317,7 @@
             </p:nvSpPr>
             <p:spPr>
               <a:xfrm>
-                <a:off x="6032886" y="2519485"/>
+                <a:off x="6032886" y="2373181"/>
                 <a:ext cx="636756" cy="355867"/>
               </a:xfrm>
               <a:prstGeom prst="rect">
@@ -5302,8 +5350,8 @@
           </p:sp>
         </mc:Fallback>
       </mc:AlternateContent>
-      <mc:AlternateContent xmlns:mc="http://schemas.openxmlformats.org/markup-compatibility/2006" xmlns:a14="http://schemas.microsoft.com/office/drawing/2010/main">
-        <mc:Choice Requires="a14">
+      <mc:AlternateContent xmlns:mc="http://schemas.openxmlformats.org/markup-compatibility/2006">
+        <mc:Choice xmlns:a14="http://schemas.microsoft.com/office/drawing/2010/main" Requires="a14">
           <p:sp>
             <p:nvSpPr>
               <p:cNvPr id="47" name="TextBox 46">
@@ -5318,7 +5366,7 @@
             </p:nvSpPr>
             <p:spPr>
               <a:xfrm>
-                <a:off x="3678159" y="2393570"/>
+                <a:off x="3678159" y="2247266"/>
                 <a:ext cx="408401" cy="338554"/>
               </a:xfrm>
               <a:prstGeom prst="rect">
@@ -5367,7 +5415,13 @@
                             <a:rPr lang="en-US" sz="1600" b="0" i="1" dirty="0" smtClean="0">
                               <a:latin typeface="Cambria Math" panose="02040503050406030204" pitchFamily="18" charset="0"/>
                             </a:rPr>
-                            <m:t>13</m:t>
+                            <m:t>𝑖</m:t>
+                          </m:r>
+                          <m:r>
+                            <a:rPr lang="en-US" sz="1600" b="0" i="1" dirty="0" smtClean="0">
+                              <a:latin typeface="Cambria Math" panose="02040503050406030204" pitchFamily="18" charset="0"/>
+                            </a:rPr>
+                            <m:t>2</m:t>
                           </m:r>
                         </m:sub>
                       </m:sSub>
@@ -5379,7 +5433,7 @@
             </p:txBody>
           </p:sp>
         </mc:Choice>
-        <mc:Fallback xmlns="">
+        <mc:Fallback>
           <p:sp>
             <p:nvSpPr>
               <p:cNvPr id="47" name="TextBox 46">
@@ -5396,16 +5450,16 @@
             </p:nvSpPr>
             <p:spPr>
               <a:xfrm>
-                <a:off x="3678159" y="2393570"/>
+                <a:off x="3678159" y="2247266"/>
                 <a:ext cx="408401" cy="338554"/>
               </a:xfrm>
               <a:prstGeom prst="rect">
                 <a:avLst/>
               </a:prstGeom>
               <a:blipFill>
-                <a:blip r:embed="rId17"/>
+                <a:blip r:embed="rId13"/>
                 <a:stretch>
-                  <a:fillRect r="-2941"/>
+                  <a:fillRect/>
                 </a:stretch>
               </a:blipFill>
               <a:ln>
@@ -5429,8 +5483,8 @@
           </p:sp>
         </mc:Fallback>
       </mc:AlternateContent>
-      <mc:AlternateContent xmlns:mc="http://schemas.openxmlformats.org/markup-compatibility/2006" xmlns:a14="http://schemas.microsoft.com/office/drawing/2010/main">
-        <mc:Choice Requires="a14">
+      <mc:AlternateContent xmlns:mc="http://schemas.openxmlformats.org/markup-compatibility/2006">
+        <mc:Choice xmlns:a14="http://schemas.microsoft.com/office/drawing/2010/main" Requires="a14">
           <p:sp>
             <p:nvSpPr>
               <p:cNvPr id="94" name="TextBox 93">
@@ -5445,7 +5499,7 @@
             </p:nvSpPr>
             <p:spPr>
               <a:xfrm>
-                <a:off x="3650934" y="935523"/>
+                <a:off x="3650934" y="789219"/>
                 <a:ext cx="474398" cy="400110"/>
               </a:xfrm>
               <a:prstGeom prst="rect">
@@ -5487,7 +5541,7 @@
                             <a:rPr lang="en-US" sz="2000" b="0" i="1" smtClean="0">
                               <a:latin typeface="Cambria Math" panose="02040503050406030204" pitchFamily="18" charset="0"/>
                             </a:rPr>
-                            <m:t>2</m:t>
+                            <m:t>1</m:t>
                           </m:r>
                         </m:sub>
                       </m:sSub>
@@ -5499,7 +5553,7 @@
             </p:txBody>
           </p:sp>
         </mc:Choice>
-        <mc:Fallback xmlns="">
+        <mc:Fallback>
           <p:sp>
             <p:nvSpPr>
               <p:cNvPr id="94" name="TextBox 93">
@@ -5516,14 +5570,14 @@
             </p:nvSpPr>
             <p:spPr>
               <a:xfrm>
-                <a:off x="3650934" y="935523"/>
+                <a:off x="3650934" y="789219"/>
                 <a:ext cx="474398" cy="400110"/>
               </a:xfrm>
               <a:prstGeom prst="rect">
                 <a:avLst/>
               </a:prstGeom>
               <a:blipFill>
-                <a:blip r:embed="rId18"/>
+                <a:blip r:embed="rId14"/>
                 <a:stretch>
                   <a:fillRect/>
                 </a:stretch>
@@ -5544,8 +5598,8 @@
           </p:sp>
         </mc:Fallback>
       </mc:AlternateContent>
-      <mc:AlternateContent xmlns:mc="http://schemas.openxmlformats.org/markup-compatibility/2006" xmlns:a14="http://schemas.microsoft.com/office/drawing/2010/main">
-        <mc:Choice Requires="a14">
+      <mc:AlternateContent xmlns:mc="http://schemas.openxmlformats.org/markup-compatibility/2006">
+        <mc:Choice xmlns:a14="http://schemas.microsoft.com/office/drawing/2010/main" Requires="a14">
           <p:sp>
             <p:nvSpPr>
               <p:cNvPr id="95" name="Rectangle 94">
@@ -5560,8 +5614,8 @@
             </p:nvSpPr>
             <p:spPr>
               <a:xfrm>
-                <a:off x="2689842" y="2333624"/>
-                <a:ext cx="492571" cy="400110"/>
+                <a:off x="2689842" y="2187320"/>
+                <a:ext cx="461665" cy="400110"/>
               </a:xfrm>
               <a:prstGeom prst="rect">
                 <a:avLst/>
@@ -5601,7 +5655,7 @@
                             <a:rPr lang="en-US" sz="2000" b="0" i="1" smtClean="0">
                               <a:latin typeface="Cambria Math" panose="02040503050406030204" pitchFamily="18" charset="0"/>
                             </a:rPr>
-                            <m:t>1</m:t>
+                            <m:t>𝑖</m:t>
                           </m:r>
                         </m:sub>
                       </m:sSub>
@@ -5613,7 +5667,7 @@
             </p:txBody>
           </p:sp>
         </mc:Choice>
-        <mc:Fallback xmlns="">
+        <mc:Fallback>
           <p:sp>
             <p:nvSpPr>
               <p:cNvPr id="95" name="Rectangle 94">
@@ -5630,16 +5684,16 @@
             </p:nvSpPr>
             <p:spPr>
               <a:xfrm>
-                <a:off x="2689842" y="2333624"/>
-                <a:ext cx="492571" cy="400110"/>
+                <a:off x="2689842" y="2187320"/>
+                <a:ext cx="461665" cy="400110"/>
               </a:xfrm>
               <a:prstGeom prst="rect">
                 <a:avLst/>
               </a:prstGeom>
               <a:blipFill>
-                <a:blip r:embed="rId19"/>
+                <a:blip r:embed="rId15"/>
                 <a:stretch>
-                  <a:fillRect b="-3125"/>
+                  <a:fillRect b="-3030"/>
                 </a:stretch>
               </a:blipFill>
             </p:spPr>
@@ -5658,8 +5712,8 @@
           </p:sp>
         </mc:Fallback>
       </mc:AlternateContent>
-      <mc:AlternateContent xmlns:mc="http://schemas.openxmlformats.org/markup-compatibility/2006" xmlns:a14="http://schemas.microsoft.com/office/drawing/2010/main">
-        <mc:Choice Requires="a14">
+      <mc:AlternateContent xmlns:mc="http://schemas.openxmlformats.org/markup-compatibility/2006">
+        <mc:Choice xmlns:a14="http://schemas.microsoft.com/office/drawing/2010/main" Requires="a14">
           <p:sp>
             <p:nvSpPr>
               <p:cNvPr id="96" name="TextBox 95">
@@ -5674,7 +5728,7 @@
             </p:nvSpPr>
             <p:spPr>
               <a:xfrm>
-                <a:off x="4489448" y="2342768"/>
+                <a:off x="4489448" y="2196464"/>
                 <a:ext cx="474398" cy="400110"/>
               </a:xfrm>
               <a:prstGeom prst="rect">
@@ -5725,7 +5779,7 @@
                               </a:solidFill>
                               <a:latin typeface="Cambria Math" panose="02040503050406030204" pitchFamily="18" charset="0"/>
                             </a:rPr>
-                            <m:t>3</m:t>
+                            <m:t>2</m:t>
                           </m:r>
                         </m:sub>
                       </m:sSub>
@@ -5741,7 +5795,7 @@
             </p:txBody>
           </p:sp>
         </mc:Choice>
-        <mc:Fallback xmlns="">
+        <mc:Fallback>
           <p:sp>
             <p:nvSpPr>
               <p:cNvPr id="96" name="TextBox 95">
@@ -5758,14 +5812,14 @@
             </p:nvSpPr>
             <p:spPr>
               <a:xfrm>
-                <a:off x="4489448" y="2342768"/>
+                <a:off x="4489448" y="2196464"/>
                 <a:ext cx="474398" cy="400110"/>
               </a:xfrm>
               <a:prstGeom prst="rect">
                 <a:avLst/>
               </a:prstGeom>
               <a:blipFill>
-                <a:blip r:embed="rId20"/>
+                <a:blip r:embed="rId16"/>
                 <a:stretch>
                   <a:fillRect/>
                 </a:stretch>
@@ -5803,8 +5857,8 @@
         </p:nvCxnSpPr>
         <p:spPr>
           <a:xfrm flipH="1">
-            <a:off x="5250175" y="2199004"/>
-            <a:ext cx="640153" cy="972022"/>
+            <a:off x="5234722" y="2052700"/>
+            <a:ext cx="655607" cy="972022"/>
           </a:xfrm>
           <a:prstGeom prst="straightConnector1">
             <a:avLst/>
@@ -5844,7 +5898,7 @@
         </p:nvCxnSpPr>
         <p:spPr>
           <a:xfrm flipH="1">
-            <a:off x="5460424" y="3489784"/>
+            <a:off x="5460424" y="3343480"/>
             <a:ext cx="1271275" cy="1479"/>
           </a:xfrm>
           <a:prstGeom prst="straightConnector1">
@@ -5869,8 +5923,8 @@
           </a:fontRef>
         </p:style>
       </p:cxnSp>
-      <mc:AlternateContent xmlns:mc="http://schemas.openxmlformats.org/markup-compatibility/2006" xmlns:a14="http://schemas.microsoft.com/office/drawing/2010/main">
-        <mc:Choice Requires="a14">
+      <mc:AlternateContent xmlns:mc="http://schemas.openxmlformats.org/markup-compatibility/2006">
+        <mc:Choice xmlns:a14="http://schemas.microsoft.com/office/drawing/2010/main" Requires="a14">
           <p:sp>
             <p:nvSpPr>
               <p:cNvPr id="52" name="TextBox 51">
@@ -5885,7 +5939,7 @@
             </p:nvSpPr>
             <p:spPr>
               <a:xfrm>
-                <a:off x="5292318" y="2535390"/>
+                <a:off x="5292318" y="2389086"/>
                 <a:ext cx="398674" cy="347091"/>
               </a:xfrm>
               <a:prstGeom prst="rect">
@@ -5934,7 +5988,13 @@
                             <a:rPr lang="en-US" sz="1600" b="0" i="1" dirty="0" smtClean="0">
                               <a:latin typeface="Cambria Math" panose="02040503050406030204" pitchFamily="18" charset="0"/>
                             </a:rPr>
-                            <m:t>12</m:t>
+                            <m:t>𝑖</m:t>
+                          </m:r>
+                          <m:r>
+                            <a:rPr lang="en-US" sz="1600" b="0" i="1" dirty="0" smtClean="0">
+                              <a:latin typeface="Cambria Math" panose="02040503050406030204" pitchFamily="18" charset="0"/>
+                            </a:rPr>
+                            <m:t>1</m:t>
                           </m:r>
                         </m:sub>
                       </m:sSub>
@@ -5946,7 +6006,7 @@
             </p:txBody>
           </p:sp>
         </mc:Choice>
-        <mc:Fallback xmlns="">
+        <mc:Fallback>
           <p:sp>
             <p:nvSpPr>
               <p:cNvPr id="52" name="TextBox 51">
@@ -5963,16 +6023,16 @@
             </p:nvSpPr>
             <p:spPr>
               <a:xfrm>
-                <a:off x="5292318" y="2535390"/>
+                <a:off x="5292318" y="2389086"/>
                 <a:ext cx="398674" cy="347091"/>
               </a:xfrm>
               <a:prstGeom prst="rect">
                 <a:avLst/>
               </a:prstGeom>
               <a:blipFill>
-                <a:blip r:embed="rId27"/>
+                <a:blip r:embed="rId17"/>
                 <a:stretch>
-                  <a:fillRect r="-3030"/>
+                  <a:fillRect/>
                 </a:stretch>
               </a:blipFill>
               <a:ln>
@@ -5996,8 +6056,8 @@
           </p:sp>
         </mc:Fallback>
       </mc:AlternateContent>
-      <mc:AlternateContent xmlns:mc="http://schemas.openxmlformats.org/markup-compatibility/2006" xmlns:a14="http://schemas.microsoft.com/office/drawing/2010/main">
-        <mc:Choice Requires="a14">
+      <mc:AlternateContent xmlns:mc="http://schemas.openxmlformats.org/markup-compatibility/2006">
+        <mc:Choice xmlns:a14="http://schemas.microsoft.com/office/drawing/2010/main" Requires="a14">
           <p:sp>
             <p:nvSpPr>
               <p:cNvPr id="53" name="TextBox 52">
@@ -6012,7 +6072,7 @@
             </p:nvSpPr>
             <p:spPr>
               <a:xfrm>
-                <a:off x="5869707" y="3348840"/>
+                <a:off x="5869707" y="3202536"/>
                 <a:ext cx="428730" cy="338554"/>
               </a:xfrm>
               <a:prstGeom prst="rect">
@@ -6061,7 +6121,13 @@
                             <a:rPr lang="en-US" sz="1600" b="0" i="1" dirty="0" smtClean="0">
                               <a:latin typeface="Cambria Math" panose="02040503050406030204" pitchFamily="18" charset="0"/>
                             </a:rPr>
-                            <m:t>13</m:t>
+                            <m:t>𝑖</m:t>
+                          </m:r>
+                          <m:r>
+                            <a:rPr lang="en-US" sz="1600" b="0" i="1" dirty="0" smtClean="0">
+                              <a:latin typeface="Cambria Math" panose="02040503050406030204" pitchFamily="18" charset="0"/>
+                            </a:rPr>
+                            <m:t>2</m:t>
                           </m:r>
                         </m:sub>
                       </m:sSub>
@@ -6073,7 +6139,7 @@
             </p:txBody>
           </p:sp>
         </mc:Choice>
-        <mc:Fallback xmlns="">
+        <mc:Fallback>
           <p:sp>
             <p:nvSpPr>
               <p:cNvPr id="53" name="TextBox 52">
@@ -6090,14 +6156,14 @@
             </p:nvSpPr>
             <p:spPr>
               <a:xfrm>
-                <a:off x="5869707" y="3348840"/>
+                <a:off x="5869707" y="3202536"/>
                 <a:ext cx="428730" cy="338554"/>
               </a:xfrm>
               <a:prstGeom prst="rect">
                 <a:avLst/>
               </a:prstGeom>
               <a:blipFill>
-                <a:blip r:embed="rId28"/>
+                <a:blip r:embed="rId18"/>
                 <a:stretch>
                   <a:fillRect/>
                 </a:stretch>
@@ -6139,7 +6205,7 @@
         </p:nvCxnSpPr>
         <p:spPr>
           <a:xfrm flipH="1" flipV="1">
-            <a:off x="3693399" y="4145471"/>
+            <a:off x="3693399" y="3935159"/>
             <a:ext cx="811290" cy="467043"/>
           </a:xfrm>
           <a:prstGeom prst="straightConnector1">
@@ -6182,8 +6248,8 @@
         </p:nvCxnSpPr>
         <p:spPr>
           <a:xfrm flipH="1" flipV="1">
-            <a:off x="3197653" y="4752623"/>
-            <a:ext cx="1295918" cy="18438"/>
+            <a:off x="3166747" y="4542311"/>
+            <a:ext cx="1326824" cy="18438"/>
           </a:xfrm>
           <a:prstGeom prst="straightConnector1">
             <a:avLst/>
@@ -6224,7 +6290,7 @@
         </p:nvCxnSpPr>
         <p:spPr>
           <a:xfrm flipH="1">
-            <a:off x="3039824" y="3532653"/>
+            <a:off x="3039824" y="3322341"/>
             <a:ext cx="685653" cy="1051584"/>
           </a:xfrm>
           <a:prstGeom prst="straightConnector1">
@@ -6249,8 +6315,8 @@
           </a:fontRef>
         </p:style>
       </p:cxnSp>
-      <mc:AlternateContent xmlns:mc="http://schemas.openxmlformats.org/markup-compatibility/2006" xmlns:a14="http://schemas.microsoft.com/office/drawing/2010/main">
-        <mc:Choice Requires="a14">
+      <mc:AlternateContent xmlns:mc="http://schemas.openxmlformats.org/markup-compatibility/2006">
+        <mc:Choice xmlns:a14="http://schemas.microsoft.com/office/drawing/2010/main" Requires="a14">
           <p:sp>
             <p:nvSpPr>
               <p:cNvPr id="61" name="TextBox 60">
@@ -6265,7 +6331,7 @@
             </p:nvSpPr>
             <p:spPr>
               <a:xfrm>
-                <a:off x="3252053" y="3741878"/>
+                <a:off x="3252053" y="3531566"/>
                 <a:ext cx="398674" cy="347091"/>
               </a:xfrm>
               <a:prstGeom prst="rect">
@@ -6314,7 +6380,13 @@
                             <a:rPr lang="en-US" sz="1600" b="0" i="1" dirty="0" smtClean="0">
                               <a:latin typeface="Cambria Math" panose="02040503050406030204" pitchFamily="18" charset="0"/>
                             </a:rPr>
-                            <m:t>12</m:t>
+                            <m:t>𝑖</m:t>
+                          </m:r>
+                          <m:r>
+                            <a:rPr lang="en-US" sz="1600" b="0" i="1" dirty="0" smtClean="0">
+                              <a:latin typeface="Cambria Math" panose="02040503050406030204" pitchFamily="18" charset="0"/>
+                            </a:rPr>
+                            <m:t>1</m:t>
                           </m:r>
                         </m:sub>
                       </m:sSub>
@@ -6326,7 +6398,7 @@
             </p:txBody>
           </p:sp>
         </mc:Choice>
-        <mc:Fallback xmlns="">
+        <mc:Fallback>
           <p:sp>
             <p:nvSpPr>
               <p:cNvPr id="61" name="TextBox 60">
@@ -6343,16 +6415,16 @@
             </p:nvSpPr>
             <p:spPr>
               <a:xfrm>
-                <a:off x="3252053" y="3741878"/>
+                <a:off x="3252053" y="3531566"/>
                 <a:ext cx="398674" cy="347091"/>
               </a:xfrm>
               <a:prstGeom prst="rect">
                 <a:avLst/>
               </a:prstGeom>
               <a:blipFill>
-                <a:blip r:embed="rId29"/>
+                <a:blip r:embed="rId19"/>
                 <a:stretch>
-                  <a:fillRect r="-6061"/>
+                  <a:fillRect/>
                 </a:stretch>
               </a:blipFill>
               <a:ln>
@@ -6376,8 +6448,8 @@
           </p:sp>
         </mc:Fallback>
       </mc:AlternateContent>
-      <mc:AlternateContent xmlns:mc="http://schemas.openxmlformats.org/markup-compatibility/2006" xmlns:a14="http://schemas.microsoft.com/office/drawing/2010/main">
-        <mc:Choice Requires="a14">
+      <mc:AlternateContent xmlns:mc="http://schemas.openxmlformats.org/markup-compatibility/2006">
+        <mc:Choice xmlns:a14="http://schemas.microsoft.com/office/drawing/2010/main" Requires="a14">
           <p:sp>
             <p:nvSpPr>
               <p:cNvPr id="63" name="TextBox 62">
@@ -6392,7 +6464,7 @@
             </p:nvSpPr>
             <p:spPr>
               <a:xfrm>
-                <a:off x="3693399" y="4612514"/>
+                <a:off x="3693399" y="4402202"/>
                 <a:ext cx="408401" cy="338554"/>
               </a:xfrm>
               <a:prstGeom prst="rect">
@@ -6441,7 +6513,13 @@
                             <a:rPr lang="en-US" sz="1600" b="0" i="1" dirty="0" smtClean="0">
                               <a:latin typeface="Cambria Math" panose="02040503050406030204" pitchFamily="18" charset="0"/>
                             </a:rPr>
-                            <m:t>13</m:t>
+                            <m:t>𝑖</m:t>
+                          </m:r>
+                          <m:r>
+                            <a:rPr lang="en-US" sz="1600" b="0" i="1" dirty="0" smtClean="0">
+                              <a:latin typeface="Cambria Math" panose="02040503050406030204" pitchFamily="18" charset="0"/>
+                            </a:rPr>
+                            <m:t>2</m:t>
                           </m:r>
                         </m:sub>
                       </m:sSub>
@@ -6453,7 +6531,7 @@
             </p:txBody>
           </p:sp>
         </mc:Choice>
-        <mc:Fallback xmlns="">
+        <mc:Fallback>
           <p:sp>
             <p:nvSpPr>
               <p:cNvPr id="63" name="TextBox 62">
@@ -6470,14 +6548,14 @@
             </p:nvSpPr>
             <p:spPr>
               <a:xfrm>
-                <a:off x="3693399" y="4612514"/>
+                <a:off x="3693399" y="4402202"/>
                 <a:ext cx="408401" cy="338554"/>
               </a:xfrm>
               <a:prstGeom prst="rect">
                 <a:avLst/>
               </a:prstGeom>
               <a:blipFill>
-                <a:blip r:embed="rId30"/>
+                <a:blip r:embed="rId20"/>
                 <a:stretch>
                   <a:fillRect/>
                 </a:stretch>
@@ -6503,8 +6581,8 @@
           </p:sp>
         </mc:Fallback>
       </mc:AlternateContent>
-      <mc:AlternateContent xmlns:mc="http://schemas.openxmlformats.org/markup-compatibility/2006" xmlns:a14="http://schemas.microsoft.com/office/drawing/2010/main">
-        <mc:Choice Requires="a14">
+      <mc:AlternateContent xmlns:mc="http://schemas.openxmlformats.org/markup-compatibility/2006">
+        <mc:Choice xmlns:a14="http://schemas.microsoft.com/office/drawing/2010/main" Requires="a14">
           <p:sp>
             <p:nvSpPr>
               <p:cNvPr id="64" name="TextBox 63">
@@ -6519,7 +6597,7 @@
             </p:nvSpPr>
             <p:spPr>
               <a:xfrm>
-                <a:off x="3666174" y="3154467"/>
+                <a:off x="3666174" y="2944155"/>
                 <a:ext cx="474398" cy="400110"/>
               </a:xfrm>
               <a:prstGeom prst="rect">
@@ -6561,7 +6639,7 @@
                             <a:rPr lang="en-US" sz="2000" b="0" i="1" smtClean="0">
                               <a:latin typeface="Cambria Math" panose="02040503050406030204" pitchFamily="18" charset="0"/>
                             </a:rPr>
-                            <m:t>2</m:t>
+                            <m:t>1</m:t>
                           </m:r>
                         </m:sub>
                       </m:sSub>
@@ -6573,7 +6651,7 @@
             </p:txBody>
           </p:sp>
         </mc:Choice>
-        <mc:Fallback xmlns="">
+        <mc:Fallback>
           <p:sp>
             <p:nvSpPr>
               <p:cNvPr id="64" name="TextBox 63">
@@ -6590,14 +6668,14 @@
             </p:nvSpPr>
             <p:spPr>
               <a:xfrm>
-                <a:off x="3666174" y="3154467"/>
+                <a:off x="3666174" y="2944155"/>
                 <a:ext cx="474398" cy="400110"/>
               </a:xfrm>
               <a:prstGeom prst="rect">
                 <a:avLst/>
               </a:prstGeom>
               <a:blipFill>
-                <a:blip r:embed="rId31"/>
+                <a:blip r:embed="rId21"/>
                 <a:stretch>
                   <a:fillRect/>
                 </a:stretch>
@@ -6618,8 +6696,8 @@
           </p:sp>
         </mc:Fallback>
       </mc:AlternateContent>
-      <mc:AlternateContent xmlns:mc="http://schemas.openxmlformats.org/markup-compatibility/2006" xmlns:a14="http://schemas.microsoft.com/office/drawing/2010/main">
-        <mc:Choice Requires="a14">
+      <mc:AlternateContent xmlns:mc="http://schemas.openxmlformats.org/markup-compatibility/2006">
+        <mc:Choice xmlns:a14="http://schemas.microsoft.com/office/drawing/2010/main" Requires="a14">
           <p:sp>
             <p:nvSpPr>
               <p:cNvPr id="65" name="Rectangle 64">
@@ -6634,8 +6712,8 @@
             </p:nvSpPr>
             <p:spPr>
               <a:xfrm>
-                <a:off x="2705082" y="4552568"/>
-                <a:ext cx="492571" cy="400110"/>
+                <a:off x="2705082" y="4342256"/>
+                <a:ext cx="461665" cy="400110"/>
               </a:xfrm>
               <a:prstGeom prst="rect">
                 <a:avLst/>
@@ -6675,7 +6753,7 @@
                             <a:rPr lang="en-US" sz="2000" b="0" i="1" smtClean="0">
                               <a:latin typeface="Cambria Math" panose="02040503050406030204" pitchFamily="18" charset="0"/>
                             </a:rPr>
-                            <m:t>1</m:t>
+                            <m:t>𝑖</m:t>
                           </m:r>
                         </m:sub>
                       </m:sSub>
@@ -6687,7 +6765,7 @@
             </p:txBody>
           </p:sp>
         </mc:Choice>
-        <mc:Fallback xmlns="">
+        <mc:Fallback>
           <p:sp>
             <p:nvSpPr>
               <p:cNvPr id="65" name="Rectangle 64">
@@ -6704,16 +6782,16 @@
             </p:nvSpPr>
             <p:spPr>
               <a:xfrm>
-                <a:off x="2705082" y="4552568"/>
-                <a:ext cx="492571" cy="400110"/>
+                <a:off x="2705082" y="4342256"/>
+                <a:ext cx="461665" cy="400110"/>
               </a:xfrm>
               <a:prstGeom prst="rect">
                 <a:avLst/>
               </a:prstGeom>
               <a:blipFill>
-                <a:blip r:embed="rId32"/>
+                <a:blip r:embed="rId22"/>
                 <a:stretch>
-                  <a:fillRect b="-3030"/>
+                  <a:fillRect b="-6250"/>
                 </a:stretch>
               </a:blipFill>
             </p:spPr>
@@ -6732,8 +6810,8 @@
           </p:sp>
         </mc:Fallback>
       </mc:AlternateContent>
-      <mc:AlternateContent xmlns:mc="http://schemas.openxmlformats.org/markup-compatibility/2006" xmlns:a14="http://schemas.microsoft.com/office/drawing/2010/main">
-        <mc:Choice Requires="a14">
+      <mc:AlternateContent xmlns:mc="http://schemas.openxmlformats.org/markup-compatibility/2006">
+        <mc:Choice xmlns:a14="http://schemas.microsoft.com/office/drawing/2010/main" Requires="a14">
           <p:sp>
             <p:nvSpPr>
               <p:cNvPr id="66" name="TextBox 65">
@@ -6748,7 +6826,7 @@
             </p:nvSpPr>
             <p:spPr>
               <a:xfrm>
-                <a:off x="4504688" y="4561712"/>
+                <a:off x="4504688" y="4351400"/>
                 <a:ext cx="474398" cy="400110"/>
               </a:xfrm>
               <a:prstGeom prst="rect">
@@ -6799,7 +6877,7 @@
                               </a:solidFill>
                               <a:latin typeface="Cambria Math" panose="02040503050406030204" pitchFamily="18" charset="0"/>
                             </a:rPr>
-                            <m:t>3</m:t>
+                            <m:t>2</m:t>
                           </m:r>
                         </m:sub>
                       </m:sSub>
@@ -6815,7 +6893,7 @@
             </p:txBody>
           </p:sp>
         </mc:Choice>
-        <mc:Fallback xmlns="">
+        <mc:Fallback>
           <p:sp>
             <p:nvSpPr>
               <p:cNvPr id="66" name="TextBox 65">
@@ -6832,14 +6910,14 @@
             </p:nvSpPr>
             <p:spPr>
               <a:xfrm>
-                <a:off x="4504688" y="4561712"/>
+                <a:off x="4504688" y="4351400"/>
                 <a:ext cx="474398" cy="400110"/>
               </a:xfrm>
               <a:prstGeom prst="rect">
                 <a:avLst/>
               </a:prstGeom>
               <a:blipFill>
-                <a:blip r:embed="rId33"/>
+                <a:blip r:embed="rId23"/>
                 <a:stretch>
                   <a:fillRect/>
                 </a:stretch>
@@ -6874,7 +6952,7 @@
         </p:nvSpPr>
         <p:spPr>
           <a:xfrm>
-            <a:off x="2717300" y="3156189"/>
+            <a:off x="2717300" y="2945877"/>
             <a:ext cx="381836" cy="400110"/>
           </a:xfrm>
           <a:prstGeom prst="rect">
@@ -6895,8 +6973,8 @@
           </a:p>
         </p:txBody>
       </p:sp>
-      <mc:AlternateContent xmlns:mc="http://schemas.openxmlformats.org/markup-compatibility/2006" xmlns:a14="http://schemas.microsoft.com/office/drawing/2010/main">
-        <mc:Choice Requires="a14">
+      <mc:AlternateContent xmlns:mc="http://schemas.openxmlformats.org/markup-compatibility/2006">
+        <mc:Choice xmlns:a14="http://schemas.microsoft.com/office/drawing/2010/main" Requires="a14">
           <p:sp>
             <p:nvSpPr>
               <p:cNvPr id="49" name="TextBox 48">
@@ -6911,8 +6989,8 @@
             </p:nvSpPr>
             <p:spPr>
               <a:xfrm>
-                <a:off x="4925305" y="4059246"/>
-                <a:ext cx="2307391" cy="277897"/>
+                <a:off x="4925305" y="3897377"/>
+                <a:ext cx="2307391" cy="295530"/>
               </a:xfrm>
               <a:prstGeom prst="rect">
                 <a:avLst/>
@@ -6953,7 +7031,7 @@
                             <a:rPr lang="en-US" sz="1800" b="0" i="1" smtClean="0">
                               <a:latin typeface="Cambria Math" panose="02040503050406030204" pitchFamily="18" charset="0"/>
                             </a:rPr>
-                            <m:t>1</m:t>
+                            <m:t>𝑖</m:t>
                           </m:r>
                         </m:sub>
                       </m:sSub>
@@ -6963,14 +7041,14 @@
                         </a:rPr>
                         <m:t>=</m:t>
                       </m:r>
-                      <m:sSup>
-                        <m:sSupPr>
+                      <m:sSubSup>
+                        <m:sSubSupPr>
                           <m:ctrlPr>
                             <a:rPr lang="en-US" sz="1800" b="0" i="1" smtClean="0">
                               <a:latin typeface="Cambria Math" panose="02040503050406030204" pitchFamily="18" charset="0"/>
                             </a:rPr>
                           </m:ctrlPr>
-                        </m:sSupPr>
+                        </m:sSubSupPr>
                         <m:e>
                           <m:r>
                             <a:rPr lang="en-US" sz="1800" i="1" smtClean="0">
@@ -6979,6 +7057,14 @@
                             <m:t>𝐹</m:t>
                           </m:r>
                         </m:e>
+                        <m:sub>
+                          <m:r>
+                            <a:rPr lang="en-US" sz="1800" b="0" i="1" smtClean="0">
+                              <a:latin typeface="Cambria Math" panose="02040503050406030204" pitchFamily="18" charset="0"/>
+                            </a:rPr>
+                            <m:t>𝑖</m:t>
+                          </m:r>
+                        </m:sub>
                         <m:sup>
                           <m:r>
                             <a:rPr lang="en-US" sz="1800" b="0" i="1" smtClean="0">
@@ -6987,7 +7073,7 @@
                             <m:t>𝐻𝑂𝐼</m:t>
                           </m:r>
                         </m:sup>
-                      </m:sSup>
+                      </m:sSubSup>
                       <m:d>
                         <m:dPr>
                           <m:ctrlPr>
@@ -6997,6 +7083,37 @@
                           </m:ctrlPr>
                         </m:dPr>
                         <m:e>
+                          <m:sSub>
+                            <m:sSubPr>
+                              <m:ctrlPr>
+                                <a:rPr lang="en-US" sz="1800" b="0" i="1" smtClean="0">
+                                  <a:latin typeface="Cambria Math" panose="02040503050406030204" pitchFamily="18" charset="0"/>
+                                </a:rPr>
+                              </m:ctrlPr>
+                            </m:sSubPr>
+                            <m:e>
+                              <m:r>
+                                <a:rPr lang="en-US" sz="1800" b="0" i="1" smtClean="0">
+                                  <a:latin typeface="Cambria Math" panose="02040503050406030204" pitchFamily="18" charset="0"/>
+                                </a:rPr>
+                                <m:t>𝑛</m:t>
+                              </m:r>
+                            </m:e>
+                            <m:sub>
+                              <m:r>
+                                <a:rPr lang="en-US" sz="1800" b="0" i="1" smtClean="0">
+                                  <a:latin typeface="Cambria Math" panose="02040503050406030204" pitchFamily="18" charset="0"/>
+                                </a:rPr>
+                                <m:t>1</m:t>
+                              </m:r>
+                            </m:sub>
+                          </m:sSub>
+                          <m:r>
+                            <a:rPr lang="en-US" sz="1800" b="0" i="1" smtClean="0">
+                              <a:latin typeface="Cambria Math" panose="02040503050406030204" pitchFamily="18" charset="0"/>
+                            </a:rPr>
+                            <m:t>, </m:t>
+                          </m:r>
                           <m:sSub>
                             <m:sSubPr>
                               <m:ctrlPr>
@@ -7022,37 +7139,6 @@
                               </m:r>
                             </m:sub>
                           </m:sSub>
-                          <m:r>
-                            <a:rPr lang="en-US" sz="1800" b="0" i="1" smtClean="0">
-                              <a:latin typeface="Cambria Math" panose="02040503050406030204" pitchFamily="18" charset="0"/>
-                            </a:rPr>
-                            <m:t>, </m:t>
-                          </m:r>
-                          <m:sSub>
-                            <m:sSubPr>
-                              <m:ctrlPr>
-                                <a:rPr lang="en-US" sz="1800" b="0" i="1" smtClean="0">
-                                  <a:latin typeface="Cambria Math" panose="02040503050406030204" pitchFamily="18" charset="0"/>
-                                </a:rPr>
-                              </m:ctrlPr>
-                            </m:sSubPr>
-                            <m:e>
-                              <m:r>
-                                <a:rPr lang="en-US" sz="1800" b="0" i="1" smtClean="0">
-                                  <a:latin typeface="Cambria Math" panose="02040503050406030204" pitchFamily="18" charset="0"/>
-                                </a:rPr>
-                                <m:t>𝑛</m:t>
-                              </m:r>
-                            </m:e>
-                            <m:sub>
-                              <m:r>
-                                <a:rPr lang="en-US" sz="1800" b="0" i="1" smtClean="0">
-                                  <a:latin typeface="Cambria Math" panose="02040503050406030204" pitchFamily="18" charset="0"/>
-                                </a:rPr>
-                                <m:t>3</m:t>
-                              </m:r>
-                            </m:sub>
-                          </m:sSub>
                         </m:e>
                       </m:d>
                     </m:oMath>
@@ -7063,7 +7149,7 @@
             </p:txBody>
           </p:sp>
         </mc:Choice>
-        <mc:Fallback xmlns="">
+        <mc:Fallback>
           <p:sp>
             <p:nvSpPr>
               <p:cNvPr id="49" name="TextBox 48">
@@ -7080,16 +7166,16 @@
             </p:nvSpPr>
             <p:spPr>
               <a:xfrm>
-                <a:off x="4925305" y="4059246"/>
-                <a:ext cx="2307391" cy="277897"/>
+                <a:off x="4925305" y="3897377"/>
+                <a:ext cx="2307391" cy="295530"/>
               </a:xfrm>
               <a:prstGeom prst="rect">
                 <a:avLst/>
               </a:prstGeom>
               <a:blipFill>
-                <a:blip r:embed="rId34"/>
+                <a:blip r:embed="rId24"/>
                 <a:stretch>
-                  <a:fillRect t="-4348" b="-21739"/>
+                  <a:fillRect b="-20833"/>
                 </a:stretch>
               </a:blipFill>
             </p:spPr>

</xml_diff>

<commit_message>
remove manuscript documents from this version for publication
</commit_message>
<xml_diff>
--- a/manuscript/interaction_modification.pptx
+++ b/manuscript/interaction_modification.pptx
@@ -243,7 +243,7 @@
           <a:p>
             <a:fld id="{DEC7EED3-ACBE-144B-BA53-7F4C4D475C19}" type="datetimeFigureOut">
               <a:rPr lang="en-US" smtClean="0"/>
-              <a:t>11/25/19</a:t>
+              <a:t>10/8/21</a:t>
             </a:fld>
             <a:endParaRPr lang="en-US"/>
           </a:p>
@@ -413,7 +413,7 @@
           <a:p>
             <a:fld id="{DEC7EED3-ACBE-144B-BA53-7F4C4D475C19}" type="datetimeFigureOut">
               <a:rPr lang="en-US" smtClean="0"/>
-              <a:t>11/25/19</a:t>
+              <a:t>10/8/21</a:t>
             </a:fld>
             <a:endParaRPr lang="en-US"/>
           </a:p>
@@ -593,7 +593,7 @@
           <a:p>
             <a:fld id="{DEC7EED3-ACBE-144B-BA53-7F4C4D475C19}" type="datetimeFigureOut">
               <a:rPr lang="en-US" smtClean="0"/>
-              <a:t>11/25/19</a:t>
+              <a:t>10/8/21</a:t>
             </a:fld>
             <a:endParaRPr lang="en-US"/>
           </a:p>
@@ -763,7 +763,7 @@
           <a:p>
             <a:fld id="{DEC7EED3-ACBE-144B-BA53-7F4C4D475C19}" type="datetimeFigureOut">
               <a:rPr lang="en-US" smtClean="0"/>
-              <a:t>11/25/19</a:t>
+              <a:t>10/8/21</a:t>
             </a:fld>
             <a:endParaRPr lang="en-US"/>
           </a:p>
@@ -1007,7 +1007,7 @@
           <a:p>
             <a:fld id="{DEC7EED3-ACBE-144B-BA53-7F4C4D475C19}" type="datetimeFigureOut">
               <a:rPr lang="en-US" smtClean="0"/>
-              <a:t>11/25/19</a:t>
+              <a:t>10/8/21</a:t>
             </a:fld>
             <a:endParaRPr lang="en-US"/>
           </a:p>
@@ -1239,7 +1239,7 @@
           <a:p>
             <a:fld id="{DEC7EED3-ACBE-144B-BA53-7F4C4D475C19}" type="datetimeFigureOut">
               <a:rPr lang="en-US" smtClean="0"/>
-              <a:t>11/25/19</a:t>
+              <a:t>10/8/21</a:t>
             </a:fld>
             <a:endParaRPr lang="en-US"/>
           </a:p>
@@ -1606,7 +1606,7 @@
           <a:p>
             <a:fld id="{DEC7EED3-ACBE-144B-BA53-7F4C4D475C19}" type="datetimeFigureOut">
               <a:rPr lang="en-US" smtClean="0"/>
-              <a:t>11/25/19</a:t>
+              <a:t>10/8/21</a:t>
             </a:fld>
             <a:endParaRPr lang="en-US"/>
           </a:p>
@@ -1724,7 +1724,7 @@
           <a:p>
             <a:fld id="{DEC7EED3-ACBE-144B-BA53-7F4C4D475C19}" type="datetimeFigureOut">
               <a:rPr lang="en-US" smtClean="0"/>
-              <a:t>11/25/19</a:t>
+              <a:t>10/8/21</a:t>
             </a:fld>
             <a:endParaRPr lang="en-US"/>
           </a:p>
@@ -1819,7 +1819,7 @@
           <a:p>
             <a:fld id="{DEC7EED3-ACBE-144B-BA53-7F4C4D475C19}" type="datetimeFigureOut">
               <a:rPr lang="en-US" smtClean="0"/>
-              <a:t>11/25/19</a:t>
+              <a:t>10/8/21</a:t>
             </a:fld>
             <a:endParaRPr lang="en-US"/>
           </a:p>
@@ -2096,7 +2096,7 @@
           <a:p>
             <a:fld id="{DEC7EED3-ACBE-144B-BA53-7F4C4D475C19}" type="datetimeFigureOut">
               <a:rPr lang="en-US" smtClean="0"/>
-              <a:t>11/25/19</a:t>
+              <a:t>10/8/21</a:t>
             </a:fld>
             <a:endParaRPr lang="en-US"/>
           </a:p>
@@ -2353,7 +2353,7 @@
           <a:p>
             <a:fld id="{DEC7EED3-ACBE-144B-BA53-7F4C4D475C19}" type="datetimeFigureOut">
               <a:rPr lang="en-US" smtClean="0"/>
-              <a:t>11/25/19</a:t>
+              <a:t>10/8/21</a:t>
             </a:fld>
             <a:endParaRPr lang="en-US"/>
           </a:p>
@@ -2566,7 +2566,7 @@
           <a:p>
             <a:fld id="{DEC7EED3-ACBE-144B-BA53-7F4C4D475C19}" type="datetimeFigureOut">
               <a:rPr lang="en-US" smtClean="0"/>
-              <a:t>11/25/19</a:t>
+              <a:t>10/8/21</a:t>
             </a:fld>
             <a:endParaRPr lang="en-US"/>
           </a:p>
@@ -3120,8 +3120,8 @@
           </a:fontRef>
         </p:style>
       </p:cxnSp>
-      <mc:AlternateContent xmlns:mc="http://schemas.openxmlformats.org/markup-compatibility/2006">
-        <mc:Choice xmlns:a14="http://schemas.microsoft.com/office/drawing/2010/main" Requires="a14">
+      <mc:AlternateContent xmlns:mc="http://schemas.openxmlformats.org/markup-compatibility/2006" xmlns:a14="http://schemas.microsoft.com/office/drawing/2010/main">
+        <mc:Choice Requires="a14">
           <p:sp>
             <p:nvSpPr>
               <p:cNvPr id="188" name="TextBox 187">
@@ -3388,7 +3388,7 @@
             </p:txBody>
           </p:sp>
         </mc:Choice>
-        <mc:Fallback>
+        <mc:Fallback xmlns="">
           <p:sp>
             <p:nvSpPr>
               <p:cNvPr id="188" name="TextBox 187">
@@ -3475,8 +3475,8 @@
           </a:fontRef>
         </p:style>
       </p:cxnSp>
-      <mc:AlternateContent xmlns:mc="http://schemas.openxmlformats.org/markup-compatibility/2006">
-        <mc:Choice xmlns:a14="http://schemas.microsoft.com/office/drawing/2010/main" Requires="a14">
+      <mc:AlternateContent xmlns:mc="http://schemas.openxmlformats.org/markup-compatibility/2006" xmlns:a14="http://schemas.microsoft.com/office/drawing/2010/main">
+        <mc:Choice Requires="a14">
           <p:sp>
             <p:nvSpPr>
               <p:cNvPr id="190" name="TextBox 189">
@@ -3545,7 +3545,7 @@
             </p:txBody>
           </p:sp>
         </mc:Choice>
-        <mc:Fallback>
+        <mc:Fallback xmlns="">
           <p:sp>
             <p:nvSpPr>
               <p:cNvPr id="190" name="TextBox 189">
@@ -3590,8 +3590,8 @@
           </p:sp>
         </mc:Fallback>
       </mc:AlternateContent>
-      <mc:AlternateContent xmlns:mc="http://schemas.openxmlformats.org/markup-compatibility/2006">
-        <mc:Choice xmlns:a14="http://schemas.microsoft.com/office/drawing/2010/main" Requires="a14">
+      <mc:AlternateContent xmlns:mc="http://schemas.openxmlformats.org/markup-compatibility/2006" xmlns:a14="http://schemas.microsoft.com/office/drawing/2010/main">
+        <mc:Choice Requires="a14">
           <p:sp>
             <p:nvSpPr>
               <p:cNvPr id="191" name="Rectangle 190">
@@ -3659,7 +3659,7 @@
             </p:txBody>
           </p:sp>
         </mc:Choice>
-        <mc:Fallback>
+        <mc:Fallback xmlns="">
           <p:sp>
             <p:nvSpPr>
               <p:cNvPr id="191" name="Rectangle 190">
@@ -3704,8 +3704,8 @@
           </p:sp>
         </mc:Fallback>
       </mc:AlternateContent>
-      <mc:AlternateContent xmlns:mc="http://schemas.openxmlformats.org/markup-compatibility/2006">
-        <mc:Choice xmlns:a14="http://schemas.microsoft.com/office/drawing/2010/main" Requires="a14">
+      <mc:AlternateContent xmlns:mc="http://schemas.openxmlformats.org/markup-compatibility/2006" xmlns:a14="http://schemas.microsoft.com/office/drawing/2010/main">
+        <mc:Choice Requires="a14">
           <p:sp>
             <p:nvSpPr>
               <p:cNvPr id="192" name="TextBox 191">
@@ -3787,7 +3787,7 @@
             </p:txBody>
           </p:sp>
         </mc:Choice>
-        <mc:Fallback>
+        <mc:Fallback xmlns="">
           <p:sp>
             <p:nvSpPr>
               <p:cNvPr id="192" name="TextBox 191">
@@ -3979,8 +3979,8 @@
           </a:p>
         </p:txBody>
       </p:sp>
-      <mc:AlternateContent xmlns:mc="http://schemas.openxmlformats.org/markup-compatibility/2006">
-        <mc:Choice xmlns:a14="http://schemas.microsoft.com/office/drawing/2010/main" Requires="a14">
+      <mc:AlternateContent xmlns:mc="http://schemas.openxmlformats.org/markup-compatibility/2006" xmlns:a14="http://schemas.microsoft.com/office/drawing/2010/main">
+        <mc:Choice Requires="a14">
           <p:sp>
             <p:nvSpPr>
               <p:cNvPr id="50" name="TextBox 49">
@@ -4062,7 +4062,7 @@
             </p:txBody>
           </p:sp>
         </mc:Choice>
-        <mc:Fallback>
+        <mc:Fallback xmlns="">
           <p:sp>
             <p:nvSpPr>
               <p:cNvPr id="50" name="TextBox 49">
@@ -4112,8 +4112,8 @@
           </p:sp>
         </mc:Fallback>
       </mc:AlternateContent>
-      <mc:AlternateContent xmlns:mc="http://schemas.openxmlformats.org/markup-compatibility/2006">
-        <mc:Choice xmlns:a14="http://schemas.microsoft.com/office/drawing/2010/main" Requires="a14">
+      <mc:AlternateContent xmlns:mc="http://schemas.openxmlformats.org/markup-compatibility/2006" xmlns:a14="http://schemas.microsoft.com/office/drawing/2010/main">
+        <mc:Choice Requires="a14">
           <p:sp>
             <p:nvSpPr>
               <p:cNvPr id="51" name="TextBox 50">
@@ -4195,7 +4195,7 @@
             </p:txBody>
           </p:sp>
         </mc:Choice>
-        <mc:Fallback>
+        <mc:Fallback xmlns="">
           <p:sp>
             <p:nvSpPr>
               <p:cNvPr id="51" name="TextBox 50">
@@ -4429,8 +4429,8 @@
           </a:fontRef>
         </p:style>
       </p:cxnSp>
-      <mc:AlternateContent xmlns:mc="http://schemas.openxmlformats.org/markup-compatibility/2006">
-        <mc:Choice xmlns:a14="http://schemas.microsoft.com/office/drawing/2010/main" Requires="a14">
+      <mc:AlternateContent xmlns:mc="http://schemas.openxmlformats.org/markup-compatibility/2006" xmlns:a14="http://schemas.microsoft.com/office/drawing/2010/main">
+        <mc:Choice Requires="a14">
           <p:sp>
             <p:nvSpPr>
               <p:cNvPr id="93" name="TextBox 92">
@@ -4512,7 +4512,7 @@
             </p:txBody>
           </p:sp>
         </mc:Choice>
-        <mc:Fallback>
+        <mc:Fallback xmlns="">
           <p:sp>
             <p:nvSpPr>
               <p:cNvPr id="93" name="TextBox 92">
@@ -4582,8 +4582,8 @@
             <a:chExt cx="1398437" cy="694108"/>
           </a:xfrm>
         </p:grpSpPr>
-        <mc:AlternateContent xmlns:mc="http://schemas.openxmlformats.org/markup-compatibility/2006">
-          <mc:Choice xmlns:a14="http://schemas.microsoft.com/office/drawing/2010/main" Requires="a14">
+        <mc:AlternateContent xmlns:mc="http://schemas.openxmlformats.org/markup-compatibility/2006" xmlns:a14="http://schemas.microsoft.com/office/drawing/2010/main">
+          <mc:Choice Requires="a14">
             <p:sp>
               <p:nvSpPr>
                 <p:cNvPr id="149" name="TextBox 148">
@@ -4652,7 +4652,7 @@
               </p:txBody>
             </p:sp>
           </mc:Choice>
-          <mc:Fallback>
+          <mc:Fallback xmlns="">
             <p:sp>
               <p:nvSpPr>
                 <p:cNvPr id="149" name="TextBox 148">
@@ -4697,8 +4697,8 @@
             </p:sp>
           </mc:Fallback>
         </mc:AlternateContent>
-        <mc:AlternateContent xmlns:mc="http://schemas.openxmlformats.org/markup-compatibility/2006">
-          <mc:Choice xmlns:a14="http://schemas.microsoft.com/office/drawing/2010/main" Requires="a14">
+        <mc:AlternateContent xmlns:mc="http://schemas.openxmlformats.org/markup-compatibility/2006" xmlns:a14="http://schemas.microsoft.com/office/drawing/2010/main">
+          <mc:Choice Requires="a14">
             <p:sp>
               <p:nvSpPr>
                 <p:cNvPr id="150" name="Rectangle 149">
@@ -4766,7 +4766,7 @@
               </p:txBody>
             </p:sp>
           </mc:Choice>
-          <mc:Fallback>
+          <mc:Fallback xmlns="">
             <p:sp>
               <p:nvSpPr>
                 <p:cNvPr id="150" name="Rectangle 149">
@@ -4811,8 +4811,8 @@
             </p:sp>
           </mc:Fallback>
         </mc:AlternateContent>
-        <mc:AlternateContent xmlns:mc="http://schemas.openxmlformats.org/markup-compatibility/2006">
-          <mc:Choice xmlns:a14="http://schemas.microsoft.com/office/drawing/2010/main" Requires="a14">
+        <mc:AlternateContent xmlns:mc="http://schemas.openxmlformats.org/markup-compatibility/2006" xmlns:a14="http://schemas.microsoft.com/office/drawing/2010/main">
+          <mc:Choice Requires="a14">
             <p:sp>
               <p:nvSpPr>
                 <p:cNvPr id="151" name="TextBox 150">
@@ -4894,7 +4894,7 @@
               </p:txBody>
             </p:sp>
           </mc:Choice>
-          <mc:Fallback>
+          <mc:Fallback xmlns="">
             <p:sp>
               <p:nvSpPr>
                 <p:cNvPr id="151" name="TextBox 150">
@@ -5194,8 +5194,8 @@
           </a:p>
         </p:txBody>
       </p:sp>
-      <mc:AlternateContent xmlns:mc="http://schemas.openxmlformats.org/markup-compatibility/2006">
-        <mc:Choice xmlns:a14="http://schemas.microsoft.com/office/drawing/2010/main" Requires="a14">
+      <mc:AlternateContent xmlns:mc="http://schemas.openxmlformats.org/markup-compatibility/2006" xmlns:a14="http://schemas.microsoft.com/office/drawing/2010/main">
+        <mc:Choice Requires="a14">
           <p:sp>
             <p:nvSpPr>
               <p:cNvPr id="212" name="TextBox 211">
@@ -5274,19 +5274,7 @@
                                 <a:rPr lang="en-US" sz="1600" b="0" i="1" dirty="0" smtClean="0">
                                   <a:latin typeface="Cambria Math" panose="02040503050406030204" pitchFamily="18" charset="0"/>
                                 </a:rPr>
-                                <m:t>1</m:t>
-                              </m:r>
-                              <m:r>
-                                <a:rPr lang="en-US" sz="1600" b="0" i="1" dirty="0" smtClean="0">
-                                  <a:latin typeface="Cambria Math" panose="02040503050406030204" pitchFamily="18" charset="0"/>
-                                </a:rPr>
-                                <m:t>,</m:t>
-                              </m:r>
-                              <m:r>
-                                <a:rPr lang="en-US" sz="1600" b="0" i="1" dirty="0" smtClean="0">
-                                  <a:latin typeface="Cambria Math" panose="02040503050406030204" pitchFamily="18" charset="0"/>
-                                </a:rPr>
-                                <m:t>2</m:t>
+                                <m:t>1,2</m:t>
                               </m:r>
                             </m:e>
                           </m:d>
@@ -5300,7 +5288,7 @@
             </p:txBody>
           </p:sp>
         </mc:Choice>
-        <mc:Fallback>
+        <mc:Fallback xmlns="">
           <p:sp>
             <p:nvSpPr>
               <p:cNvPr id="212" name="TextBox 211">
@@ -5350,8 +5338,8 @@
           </p:sp>
         </mc:Fallback>
       </mc:AlternateContent>
-      <mc:AlternateContent xmlns:mc="http://schemas.openxmlformats.org/markup-compatibility/2006">
-        <mc:Choice xmlns:a14="http://schemas.microsoft.com/office/drawing/2010/main" Requires="a14">
+      <mc:AlternateContent xmlns:mc="http://schemas.openxmlformats.org/markup-compatibility/2006" xmlns:a14="http://schemas.microsoft.com/office/drawing/2010/main">
+        <mc:Choice Requires="a14">
           <p:sp>
             <p:nvSpPr>
               <p:cNvPr id="47" name="TextBox 46">
@@ -5433,7 +5421,7 @@
             </p:txBody>
           </p:sp>
         </mc:Choice>
-        <mc:Fallback>
+        <mc:Fallback xmlns="">
           <p:sp>
             <p:nvSpPr>
               <p:cNvPr id="47" name="TextBox 46">
@@ -5483,8 +5471,8 @@
           </p:sp>
         </mc:Fallback>
       </mc:AlternateContent>
-      <mc:AlternateContent xmlns:mc="http://schemas.openxmlformats.org/markup-compatibility/2006">
-        <mc:Choice xmlns:a14="http://schemas.microsoft.com/office/drawing/2010/main" Requires="a14">
+      <mc:AlternateContent xmlns:mc="http://schemas.openxmlformats.org/markup-compatibility/2006" xmlns:a14="http://schemas.microsoft.com/office/drawing/2010/main">
+        <mc:Choice Requires="a14">
           <p:sp>
             <p:nvSpPr>
               <p:cNvPr id="94" name="TextBox 93">
@@ -5553,7 +5541,7 @@
             </p:txBody>
           </p:sp>
         </mc:Choice>
-        <mc:Fallback>
+        <mc:Fallback xmlns="">
           <p:sp>
             <p:nvSpPr>
               <p:cNvPr id="94" name="TextBox 93">
@@ -5598,8 +5586,8 @@
           </p:sp>
         </mc:Fallback>
       </mc:AlternateContent>
-      <mc:AlternateContent xmlns:mc="http://schemas.openxmlformats.org/markup-compatibility/2006">
-        <mc:Choice xmlns:a14="http://schemas.microsoft.com/office/drawing/2010/main" Requires="a14">
+      <mc:AlternateContent xmlns:mc="http://schemas.openxmlformats.org/markup-compatibility/2006" xmlns:a14="http://schemas.microsoft.com/office/drawing/2010/main">
+        <mc:Choice Requires="a14">
           <p:sp>
             <p:nvSpPr>
               <p:cNvPr id="95" name="Rectangle 94">
@@ -5667,7 +5655,7 @@
             </p:txBody>
           </p:sp>
         </mc:Choice>
-        <mc:Fallback>
+        <mc:Fallback xmlns="">
           <p:sp>
             <p:nvSpPr>
               <p:cNvPr id="95" name="Rectangle 94">
@@ -5712,8 +5700,8 @@
           </p:sp>
         </mc:Fallback>
       </mc:AlternateContent>
-      <mc:AlternateContent xmlns:mc="http://schemas.openxmlformats.org/markup-compatibility/2006">
-        <mc:Choice xmlns:a14="http://schemas.microsoft.com/office/drawing/2010/main" Requires="a14">
+      <mc:AlternateContent xmlns:mc="http://schemas.openxmlformats.org/markup-compatibility/2006" xmlns:a14="http://schemas.microsoft.com/office/drawing/2010/main">
+        <mc:Choice Requires="a14">
           <p:sp>
             <p:nvSpPr>
               <p:cNvPr id="96" name="TextBox 95">
@@ -5795,7 +5783,7 @@
             </p:txBody>
           </p:sp>
         </mc:Choice>
-        <mc:Fallback>
+        <mc:Fallback xmlns="">
           <p:sp>
             <p:nvSpPr>
               <p:cNvPr id="96" name="TextBox 95">
@@ -5923,8 +5911,8 @@
           </a:fontRef>
         </p:style>
       </p:cxnSp>
-      <mc:AlternateContent xmlns:mc="http://schemas.openxmlformats.org/markup-compatibility/2006">
-        <mc:Choice xmlns:a14="http://schemas.microsoft.com/office/drawing/2010/main" Requires="a14">
+      <mc:AlternateContent xmlns:mc="http://schemas.openxmlformats.org/markup-compatibility/2006" xmlns:a14="http://schemas.microsoft.com/office/drawing/2010/main">
+        <mc:Choice Requires="a14">
           <p:sp>
             <p:nvSpPr>
               <p:cNvPr id="52" name="TextBox 51">
@@ -6006,7 +5994,7 @@
             </p:txBody>
           </p:sp>
         </mc:Choice>
-        <mc:Fallback>
+        <mc:Fallback xmlns="">
           <p:sp>
             <p:nvSpPr>
               <p:cNvPr id="52" name="TextBox 51">
@@ -6056,8 +6044,8 @@
           </p:sp>
         </mc:Fallback>
       </mc:AlternateContent>
-      <mc:AlternateContent xmlns:mc="http://schemas.openxmlformats.org/markup-compatibility/2006">
-        <mc:Choice xmlns:a14="http://schemas.microsoft.com/office/drawing/2010/main" Requires="a14">
+      <mc:AlternateContent xmlns:mc="http://schemas.openxmlformats.org/markup-compatibility/2006" xmlns:a14="http://schemas.microsoft.com/office/drawing/2010/main">
+        <mc:Choice Requires="a14">
           <p:sp>
             <p:nvSpPr>
               <p:cNvPr id="53" name="TextBox 52">
@@ -6139,7 +6127,7 @@
             </p:txBody>
           </p:sp>
         </mc:Choice>
-        <mc:Fallback>
+        <mc:Fallback xmlns="">
           <p:sp>
             <p:nvSpPr>
               <p:cNvPr id="53" name="TextBox 52">
@@ -6315,8 +6303,8 @@
           </a:fontRef>
         </p:style>
       </p:cxnSp>
-      <mc:AlternateContent xmlns:mc="http://schemas.openxmlformats.org/markup-compatibility/2006">
-        <mc:Choice xmlns:a14="http://schemas.microsoft.com/office/drawing/2010/main" Requires="a14">
+      <mc:AlternateContent xmlns:mc="http://schemas.openxmlformats.org/markup-compatibility/2006" xmlns:a14="http://schemas.microsoft.com/office/drawing/2010/main">
+        <mc:Choice Requires="a14">
           <p:sp>
             <p:nvSpPr>
               <p:cNvPr id="61" name="TextBox 60">
@@ -6398,7 +6386,7 @@
             </p:txBody>
           </p:sp>
         </mc:Choice>
-        <mc:Fallback>
+        <mc:Fallback xmlns="">
           <p:sp>
             <p:nvSpPr>
               <p:cNvPr id="61" name="TextBox 60">
@@ -6448,8 +6436,8 @@
           </p:sp>
         </mc:Fallback>
       </mc:AlternateContent>
-      <mc:AlternateContent xmlns:mc="http://schemas.openxmlformats.org/markup-compatibility/2006">
-        <mc:Choice xmlns:a14="http://schemas.microsoft.com/office/drawing/2010/main" Requires="a14">
+      <mc:AlternateContent xmlns:mc="http://schemas.openxmlformats.org/markup-compatibility/2006" xmlns:a14="http://schemas.microsoft.com/office/drawing/2010/main">
+        <mc:Choice Requires="a14">
           <p:sp>
             <p:nvSpPr>
               <p:cNvPr id="63" name="TextBox 62">
@@ -6531,7 +6519,7 @@
             </p:txBody>
           </p:sp>
         </mc:Choice>
-        <mc:Fallback>
+        <mc:Fallback xmlns="">
           <p:sp>
             <p:nvSpPr>
               <p:cNvPr id="63" name="TextBox 62">
@@ -6581,8 +6569,8 @@
           </p:sp>
         </mc:Fallback>
       </mc:AlternateContent>
-      <mc:AlternateContent xmlns:mc="http://schemas.openxmlformats.org/markup-compatibility/2006">
-        <mc:Choice xmlns:a14="http://schemas.microsoft.com/office/drawing/2010/main" Requires="a14">
+      <mc:AlternateContent xmlns:mc="http://schemas.openxmlformats.org/markup-compatibility/2006" xmlns:a14="http://schemas.microsoft.com/office/drawing/2010/main">
+        <mc:Choice Requires="a14">
           <p:sp>
             <p:nvSpPr>
               <p:cNvPr id="64" name="TextBox 63">
@@ -6651,7 +6639,7 @@
             </p:txBody>
           </p:sp>
         </mc:Choice>
-        <mc:Fallback>
+        <mc:Fallback xmlns="">
           <p:sp>
             <p:nvSpPr>
               <p:cNvPr id="64" name="TextBox 63">
@@ -6696,8 +6684,8 @@
           </p:sp>
         </mc:Fallback>
       </mc:AlternateContent>
-      <mc:AlternateContent xmlns:mc="http://schemas.openxmlformats.org/markup-compatibility/2006">
-        <mc:Choice xmlns:a14="http://schemas.microsoft.com/office/drawing/2010/main" Requires="a14">
+      <mc:AlternateContent xmlns:mc="http://schemas.openxmlformats.org/markup-compatibility/2006" xmlns:a14="http://schemas.microsoft.com/office/drawing/2010/main">
+        <mc:Choice Requires="a14">
           <p:sp>
             <p:nvSpPr>
               <p:cNvPr id="65" name="Rectangle 64">
@@ -6765,7 +6753,7 @@
             </p:txBody>
           </p:sp>
         </mc:Choice>
-        <mc:Fallback>
+        <mc:Fallback xmlns="">
           <p:sp>
             <p:nvSpPr>
               <p:cNvPr id="65" name="Rectangle 64">
@@ -6810,8 +6798,8 @@
           </p:sp>
         </mc:Fallback>
       </mc:AlternateContent>
-      <mc:AlternateContent xmlns:mc="http://schemas.openxmlformats.org/markup-compatibility/2006">
-        <mc:Choice xmlns:a14="http://schemas.microsoft.com/office/drawing/2010/main" Requires="a14">
+      <mc:AlternateContent xmlns:mc="http://schemas.openxmlformats.org/markup-compatibility/2006" xmlns:a14="http://schemas.microsoft.com/office/drawing/2010/main">
+        <mc:Choice Requires="a14">
           <p:sp>
             <p:nvSpPr>
               <p:cNvPr id="66" name="TextBox 65">
@@ -6893,7 +6881,7 @@
             </p:txBody>
           </p:sp>
         </mc:Choice>
-        <mc:Fallback>
+        <mc:Fallback xmlns="">
           <p:sp>
             <p:nvSpPr>
               <p:cNvPr id="66" name="TextBox 65">
@@ -6973,8 +6961,8 @@
           </a:p>
         </p:txBody>
       </p:sp>
-      <mc:AlternateContent xmlns:mc="http://schemas.openxmlformats.org/markup-compatibility/2006">
-        <mc:Choice xmlns:a14="http://schemas.microsoft.com/office/drawing/2010/main" Requires="a14">
+      <mc:AlternateContent xmlns:mc="http://schemas.openxmlformats.org/markup-compatibility/2006" xmlns:a14="http://schemas.microsoft.com/office/drawing/2010/main">
+        <mc:Choice Requires="a14">
           <p:sp>
             <p:nvSpPr>
               <p:cNvPr id="49" name="TextBox 48">
@@ -7149,7 +7137,7 @@
             </p:txBody>
           </p:sp>
         </mc:Choice>
-        <mc:Fallback>
+        <mc:Fallback xmlns="">
           <p:sp>
             <p:nvSpPr>
               <p:cNvPr id="49" name="TextBox 48">

</xml_diff>